<commit_message>
second lecture fix 1.1
</commit_message>
<xml_diff>
--- a/02-OSs-and-VMs.pptx
+++ b/02-OSs-and-VMs.pptx
@@ -5,24 +5,23 @@
     <p:sldMasterId id="2147483648" r:id="rId2"/>
     <p:sldMasterId id="2147483661" r:id="rId3"/>
     <p:sldMasterId id="2147483674" r:id="rId4"/>
-    <p:sldMasterId id="2147483687" r:id="rId5"/>
   </p:sldMasterIdLst>
   <p:sldIdLst>
-    <p:sldId id="256" r:id="rId6"/>
-    <p:sldId id="257" r:id="rId7"/>
-    <p:sldId id="258" r:id="rId8"/>
-    <p:sldId id="259" r:id="rId9"/>
-    <p:sldId id="260" r:id="rId10"/>
-    <p:sldId id="261" r:id="rId11"/>
-    <p:sldId id="262" r:id="rId12"/>
-    <p:sldId id="263" r:id="rId13"/>
-    <p:sldId id="264" r:id="rId14"/>
-    <p:sldId id="265" r:id="rId15"/>
-    <p:sldId id="266" r:id="rId16"/>
-    <p:sldId id="267" r:id="rId17"/>
-    <p:sldId id="268" r:id="rId18"/>
-    <p:sldId id="269" r:id="rId19"/>
-    <p:sldId id="270" r:id="rId20"/>
+    <p:sldId id="256" r:id="rId5"/>
+    <p:sldId id="257" r:id="rId6"/>
+    <p:sldId id="258" r:id="rId7"/>
+    <p:sldId id="259" r:id="rId8"/>
+    <p:sldId id="260" r:id="rId9"/>
+    <p:sldId id="261" r:id="rId10"/>
+    <p:sldId id="262" r:id="rId11"/>
+    <p:sldId id="263" r:id="rId12"/>
+    <p:sldId id="264" r:id="rId13"/>
+    <p:sldId id="265" r:id="rId14"/>
+    <p:sldId id="266" r:id="rId15"/>
+    <p:sldId id="267" r:id="rId16"/>
+    <p:sldId id="268" r:id="rId17"/>
+    <p:sldId id="269" r:id="rId18"/>
+    <p:sldId id="270" r:id="rId19"/>
   </p:sldIdLst>
   <p:sldSz cx="9144000" cy="6858000"/>
   <p:notesSz cx="7559675" cy="10691812"/>
@@ -2911,179 +2910,6 @@
 </p:sldLayout>
 </file>
 
-<file path=ppt/slideLayouts/slideLayout37.xml><?xml version="1.0" encoding="utf-8"?>
-<p:sldLayout xmlns:a="http://schemas.openxmlformats.org/drawingml/2006/main" xmlns:p="http://schemas.openxmlformats.org/presentationml/2006/main" xmlns:r="http://schemas.openxmlformats.org/officeDocument/2006/relationships" type="blank" preserve="1">
-  <p:cSld name="Blank Slide">
-    <p:spTree>
-      <p:nvGrpSpPr>
-        <p:cNvPr id="1" name=""/>
-        <p:cNvGrpSpPr/>
-        <p:nvPr/>
-      </p:nvGrpSpPr>
-      <p:grpSpPr>
-        <a:xfrm>
-          <a:off x="0" y="0"/>
-          <a:ext cx="0" cy="0"/>
-          <a:chOff x="0" y="0"/>
-          <a:chExt cx="0" cy="0"/>
-        </a:xfrm>
-      </p:grpSpPr>
-    </p:spTree>
-  </p:cSld>
-</p:sldLayout>
-</file>
-
-<file path=ppt/slideLayouts/slideLayout38.xml><?xml version="1.0" encoding="utf-8"?>
-<p:sldLayout xmlns:a="http://schemas.openxmlformats.org/drawingml/2006/main" xmlns:p="http://schemas.openxmlformats.org/presentationml/2006/main" xmlns:r="http://schemas.openxmlformats.org/officeDocument/2006/relationships" type="tx" preserve="1">
-  <p:cSld name="Title Slide">
-    <p:spTree>
-      <p:nvGrpSpPr>
-        <p:cNvPr id="1" name=""/>
-        <p:cNvGrpSpPr/>
-        <p:nvPr/>
-      </p:nvGrpSpPr>
-      <p:grpSpPr>
-        <a:xfrm>
-          <a:off x="0" y="0"/>
-          <a:ext cx="0" cy="0"/>
-          <a:chOff x="0" y="0"/>
-          <a:chExt cx="0" cy="0"/>
-        </a:xfrm>
-      </p:grpSpPr>
-      <p:sp>
-        <p:nvSpPr>
-          <p:cNvPr id="113" name="PlaceHolder 1"/>
-          <p:cNvSpPr>
-            <a:spLocks noGrp="1"/>
-          </p:cNvSpPr>
-          <p:nvPr>
-            <p:ph type="title"/>
-          </p:nvPr>
-        </p:nvSpPr>
-        <p:spPr>
-          <a:xfrm>
-            <a:off x="457200" y="273600"/>
-            <a:ext cx="8229240" cy="1144800"/>
-          </a:xfrm>
-          <a:prstGeom prst="rect">
-            <a:avLst/>
-          </a:prstGeom>
-        </p:spPr>
-        <p:txBody>
-          <a:bodyPr lIns="0" rIns="0" tIns="0" bIns="0" anchor="ctr"/>
-          <a:p>
-            <a:pPr algn="ctr"/>
-            <a:endParaRPr/>
-          </a:p>
-        </p:txBody>
-      </p:sp>
-      <p:sp>
-        <p:nvSpPr>
-          <p:cNvPr id="114" name="PlaceHolder 2"/>
-          <p:cNvSpPr>
-            <a:spLocks noGrp="1"/>
-          </p:cNvSpPr>
-          <p:nvPr>
-            <p:ph type="subTitle"/>
-          </p:nvPr>
-        </p:nvSpPr>
-        <p:spPr>
-          <a:xfrm>
-            <a:off x="457200" y="1604520"/>
-            <a:ext cx="8229240" cy="3977280"/>
-          </a:xfrm>
-          <a:prstGeom prst="rect">
-            <a:avLst/>
-          </a:prstGeom>
-        </p:spPr>
-        <p:txBody>
-          <a:bodyPr lIns="0" rIns="0" tIns="0" bIns="0" anchor="ctr"/>
-          <a:p>
-            <a:pPr algn="ctr"/>
-            <a:endParaRPr/>
-          </a:p>
-        </p:txBody>
-      </p:sp>
-    </p:spTree>
-  </p:cSld>
-</p:sldLayout>
-</file>
-
-<file path=ppt/slideLayouts/slideLayout39.xml><?xml version="1.0" encoding="utf-8"?>
-<p:sldLayout xmlns:a="http://schemas.openxmlformats.org/drawingml/2006/main" xmlns:p="http://schemas.openxmlformats.org/presentationml/2006/main" xmlns:r="http://schemas.openxmlformats.org/officeDocument/2006/relationships" type="obj" preserve="1">
-  <p:cSld name="Title, Content">
-    <p:spTree>
-      <p:nvGrpSpPr>
-        <p:cNvPr id="1" name=""/>
-        <p:cNvGrpSpPr/>
-        <p:nvPr/>
-      </p:nvGrpSpPr>
-      <p:grpSpPr>
-        <a:xfrm>
-          <a:off x="0" y="0"/>
-          <a:ext cx="0" cy="0"/>
-          <a:chOff x="0" y="0"/>
-          <a:chExt cx="0" cy="0"/>
-        </a:xfrm>
-      </p:grpSpPr>
-      <p:sp>
-        <p:nvSpPr>
-          <p:cNvPr id="115" name="PlaceHolder 1"/>
-          <p:cNvSpPr>
-            <a:spLocks noGrp="1"/>
-          </p:cNvSpPr>
-          <p:nvPr>
-            <p:ph type="title"/>
-          </p:nvPr>
-        </p:nvSpPr>
-        <p:spPr>
-          <a:xfrm>
-            <a:off x="457200" y="273600"/>
-            <a:ext cx="8229240" cy="1144800"/>
-          </a:xfrm>
-          <a:prstGeom prst="rect">
-            <a:avLst/>
-          </a:prstGeom>
-        </p:spPr>
-        <p:txBody>
-          <a:bodyPr lIns="0" rIns="0" tIns="0" bIns="0" anchor="ctr"/>
-          <a:p>
-            <a:pPr algn="ctr"/>
-            <a:endParaRPr/>
-          </a:p>
-        </p:txBody>
-      </p:sp>
-      <p:sp>
-        <p:nvSpPr>
-          <p:cNvPr id="116" name="PlaceHolder 2"/>
-          <p:cNvSpPr>
-            <a:spLocks noGrp="1"/>
-          </p:cNvSpPr>
-          <p:nvPr>
-            <p:ph type="body"/>
-          </p:nvPr>
-        </p:nvSpPr>
-        <p:spPr>
-          <a:xfrm>
-            <a:off x="457200" y="1604520"/>
-            <a:ext cx="8229240" cy="3977280"/>
-          </a:xfrm>
-          <a:prstGeom prst="rect">
-            <a:avLst/>
-          </a:prstGeom>
-        </p:spPr>
-        <p:txBody>
-          <a:bodyPr lIns="0" rIns="0" tIns="0" bIns="0"/>
-          <a:p>
-            <a:endParaRPr/>
-          </a:p>
-        </p:txBody>
-      </p:sp>
-    </p:spTree>
-  </p:cSld>
-</p:sldLayout>
-</file>
-
 <file path=ppt/slideLayouts/slideLayout4.xml><?xml version="1.0" encoding="utf-8"?>
 <p:sldLayout xmlns:a="http://schemas.openxmlformats.org/drawingml/2006/main" xmlns:p="http://schemas.openxmlformats.org/presentationml/2006/main" xmlns:r="http://schemas.openxmlformats.org/officeDocument/2006/relationships" type="twoObj" preserve="1">
   <p:cSld name="Title, 2 Content">
@@ -3180,987 +3006,6 @@
           </a:p>
         </p:txBody>
       </p:sp>
-    </p:spTree>
-  </p:cSld>
-</p:sldLayout>
-</file>
-
-<file path=ppt/slideLayouts/slideLayout40.xml><?xml version="1.0" encoding="utf-8"?>
-<p:sldLayout xmlns:a="http://schemas.openxmlformats.org/drawingml/2006/main" xmlns:p="http://schemas.openxmlformats.org/presentationml/2006/main" xmlns:r="http://schemas.openxmlformats.org/officeDocument/2006/relationships" type="twoObj" preserve="1">
-  <p:cSld name="Title, 2 Content">
-    <p:spTree>
-      <p:nvGrpSpPr>
-        <p:cNvPr id="1" name=""/>
-        <p:cNvGrpSpPr/>
-        <p:nvPr/>
-      </p:nvGrpSpPr>
-      <p:grpSpPr>
-        <a:xfrm>
-          <a:off x="0" y="0"/>
-          <a:ext cx="0" cy="0"/>
-          <a:chOff x="0" y="0"/>
-          <a:chExt cx="0" cy="0"/>
-        </a:xfrm>
-      </p:grpSpPr>
-      <p:sp>
-        <p:nvSpPr>
-          <p:cNvPr id="117" name="PlaceHolder 1"/>
-          <p:cNvSpPr>
-            <a:spLocks noGrp="1"/>
-          </p:cNvSpPr>
-          <p:nvPr>
-            <p:ph type="title"/>
-          </p:nvPr>
-        </p:nvSpPr>
-        <p:spPr>
-          <a:xfrm>
-            <a:off x="457200" y="273600"/>
-            <a:ext cx="8229240" cy="1144800"/>
-          </a:xfrm>
-          <a:prstGeom prst="rect">
-            <a:avLst/>
-          </a:prstGeom>
-        </p:spPr>
-        <p:txBody>
-          <a:bodyPr lIns="0" rIns="0" tIns="0" bIns="0" anchor="ctr"/>
-          <a:p>
-            <a:pPr algn="ctr"/>
-            <a:endParaRPr/>
-          </a:p>
-        </p:txBody>
-      </p:sp>
-      <p:sp>
-        <p:nvSpPr>
-          <p:cNvPr id="118" name="PlaceHolder 2"/>
-          <p:cNvSpPr>
-            <a:spLocks noGrp="1"/>
-          </p:cNvSpPr>
-          <p:nvPr>
-            <p:ph type="body"/>
-          </p:nvPr>
-        </p:nvSpPr>
-        <p:spPr>
-          <a:xfrm>
-            <a:off x="457200" y="1604520"/>
-            <a:ext cx="4015800" cy="3977280"/>
-          </a:xfrm>
-          <a:prstGeom prst="rect">
-            <a:avLst/>
-          </a:prstGeom>
-        </p:spPr>
-        <p:txBody>
-          <a:bodyPr lIns="0" rIns="0" tIns="0" bIns="0"/>
-          <a:p>
-            <a:endParaRPr/>
-          </a:p>
-        </p:txBody>
-      </p:sp>
-      <p:sp>
-        <p:nvSpPr>
-          <p:cNvPr id="119" name="PlaceHolder 3"/>
-          <p:cNvSpPr>
-            <a:spLocks noGrp="1"/>
-          </p:cNvSpPr>
-          <p:nvPr>
-            <p:ph type="body"/>
-          </p:nvPr>
-        </p:nvSpPr>
-        <p:spPr>
-          <a:xfrm>
-            <a:off x="4674240" y="1604520"/>
-            <a:ext cx="4015800" cy="3977280"/>
-          </a:xfrm>
-          <a:prstGeom prst="rect">
-            <a:avLst/>
-          </a:prstGeom>
-        </p:spPr>
-        <p:txBody>
-          <a:bodyPr lIns="0" rIns="0" tIns="0" bIns="0"/>
-          <a:p>
-            <a:endParaRPr/>
-          </a:p>
-        </p:txBody>
-      </p:sp>
-    </p:spTree>
-  </p:cSld>
-</p:sldLayout>
-</file>
-
-<file path=ppt/slideLayouts/slideLayout41.xml><?xml version="1.0" encoding="utf-8"?>
-<p:sldLayout xmlns:a="http://schemas.openxmlformats.org/drawingml/2006/main" xmlns:p="http://schemas.openxmlformats.org/presentationml/2006/main" xmlns:r="http://schemas.openxmlformats.org/officeDocument/2006/relationships" type="titleOnly" preserve="1">
-  <p:cSld name="Title Only">
-    <p:spTree>
-      <p:nvGrpSpPr>
-        <p:cNvPr id="1" name=""/>
-        <p:cNvGrpSpPr/>
-        <p:nvPr/>
-      </p:nvGrpSpPr>
-      <p:grpSpPr>
-        <a:xfrm>
-          <a:off x="0" y="0"/>
-          <a:ext cx="0" cy="0"/>
-          <a:chOff x="0" y="0"/>
-          <a:chExt cx="0" cy="0"/>
-        </a:xfrm>
-      </p:grpSpPr>
-      <p:sp>
-        <p:nvSpPr>
-          <p:cNvPr id="120" name="PlaceHolder 1"/>
-          <p:cNvSpPr>
-            <a:spLocks noGrp="1"/>
-          </p:cNvSpPr>
-          <p:nvPr>
-            <p:ph type="title"/>
-          </p:nvPr>
-        </p:nvSpPr>
-        <p:spPr>
-          <a:xfrm>
-            <a:off x="457200" y="273600"/>
-            <a:ext cx="8229240" cy="1144800"/>
-          </a:xfrm>
-          <a:prstGeom prst="rect">
-            <a:avLst/>
-          </a:prstGeom>
-        </p:spPr>
-        <p:txBody>
-          <a:bodyPr lIns="0" rIns="0" tIns="0" bIns="0" anchor="ctr"/>
-          <a:p>
-            <a:pPr algn="ctr"/>
-            <a:endParaRPr/>
-          </a:p>
-        </p:txBody>
-      </p:sp>
-    </p:spTree>
-  </p:cSld>
-</p:sldLayout>
-</file>
-
-<file path=ppt/slideLayouts/slideLayout42.xml><?xml version="1.0" encoding="utf-8"?>
-<p:sldLayout xmlns:a="http://schemas.openxmlformats.org/drawingml/2006/main" xmlns:p="http://schemas.openxmlformats.org/presentationml/2006/main" xmlns:r="http://schemas.openxmlformats.org/officeDocument/2006/relationships" type="objOnly" preserve="1">
-  <p:cSld name="Centered Text">
-    <p:spTree>
-      <p:nvGrpSpPr>
-        <p:cNvPr id="1" name=""/>
-        <p:cNvGrpSpPr/>
-        <p:nvPr/>
-      </p:nvGrpSpPr>
-      <p:grpSpPr>
-        <a:xfrm>
-          <a:off x="0" y="0"/>
-          <a:ext cx="0" cy="0"/>
-          <a:chOff x="0" y="0"/>
-          <a:chExt cx="0" cy="0"/>
-        </a:xfrm>
-      </p:grpSpPr>
-      <p:sp>
-        <p:nvSpPr>
-          <p:cNvPr id="121" name="PlaceHolder 1"/>
-          <p:cNvSpPr>
-            <a:spLocks noGrp="1"/>
-          </p:cNvSpPr>
-          <p:nvPr>
-            <p:ph type="subTitle"/>
-          </p:nvPr>
-        </p:nvSpPr>
-        <p:spPr>
-          <a:xfrm>
-            <a:off x="457200" y="273600"/>
-            <a:ext cx="8229240" cy="5307840"/>
-          </a:xfrm>
-          <a:prstGeom prst="rect">
-            <a:avLst/>
-          </a:prstGeom>
-        </p:spPr>
-        <p:txBody>
-          <a:bodyPr lIns="0" rIns="0" tIns="0" bIns="0" anchor="ctr"/>
-          <a:p>
-            <a:pPr algn="ctr"/>
-            <a:endParaRPr/>
-          </a:p>
-        </p:txBody>
-      </p:sp>
-    </p:spTree>
-  </p:cSld>
-</p:sldLayout>
-</file>
-
-<file path=ppt/slideLayouts/slideLayout43.xml><?xml version="1.0" encoding="utf-8"?>
-<p:sldLayout xmlns:a="http://schemas.openxmlformats.org/drawingml/2006/main" xmlns:p="http://schemas.openxmlformats.org/presentationml/2006/main" xmlns:r="http://schemas.openxmlformats.org/officeDocument/2006/relationships" type="twoObjAndObj" preserve="1">
-  <p:cSld name="Title, 2 Content and Content">
-    <p:spTree>
-      <p:nvGrpSpPr>
-        <p:cNvPr id="1" name=""/>
-        <p:cNvGrpSpPr/>
-        <p:nvPr/>
-      </p:nvGrpSpPr>
-      <p:grpSpPr>
-        <a:xfrm>
-          <a:off x="0" y="0"/>
-          <a:ext cx="0" cy="0"/>
-          <a:chOff x="0" y="0"/>
-          <a:chExt cx="0" cy="0"/>
-        </a:xfrm>
-      </p:grpSpPr>
-      <p:sp>
-        <p:nvSpPr>
-          <p:cNvPr id="122" name="PlaceHolder 1"/>
-          <p:cNvSpPr>
-            <a:spLocks noGrp="1"/>
-          </p:cNvSpPr>
-          <p:nvPr>
-            <p:ph type="title"/>
-          </p:nvPr>
-        </p:nvSpPr>
-        <p:spPr>
-          <a:xfrm>
-            <a:off x="457200" y="273600"/>
-            <a:ext cx="8229240" cy="1144800"/>
-          </a:xfrm>
-          <a:prstGeom prst="rect">
-            <a:avLst/>
-          </a:prstGeom>
-        </p:spPr>
-        <p:txBody>
-          <a:bodyPr lIns="0" rIns="0" tIns="0" bIns="0" anchor="ctr"/>
-          <a:p>
-            <a:pPr algn="ctr"/>
-            <a:endParaRPr/>
-          </a:p>
-        </p:txBody>
-      </p:sp>
-      <p:sp>
-        <p:nvSpPr>
-          <p:cNvPr id="123" name="PlaceHolder 2"/>
-          <p:cNvSpPr>
-            <a:spLocks noGrp="1"/>
-          </p:cNvSpPr>
-          <p:nvPr>
-            <p:ph type="body"/>
-          </p:nvPr>
-        </p:nvSpPr>
-        <p:spPr>
-          <a:xfrm>
-            <a:off x="457200" y="1604520"/>
-            <a:ext cx="4015800" cy="1896840"/>
-          </a:xfrm>
-          <a:prstGeom prst="rect">
-            <a:avLst/>
-          </a:prstGeom>
-        </p:spPr>
-        <p:txBody>
-          <a:bodyPr lIns="0" rIns="0" tIns="0" bIns="0"/>
-          <a:p>
-            <a:endParaRPr/>
-          </a:p>
-        </p:txBody>
-      </p:sp>
-      <p:sp>
-        <p:nvSpPr>
-          <p:cNvPr id="124" name="PlaceHolder 3"/>
-          <p:cNvSpPr>
-            <a:spLocks noGrp="1"/>
-          </p:cNvSpPr>
-          <p:nvPr>
-            <p:ph type="body"/>
-          </p:nvPr>
-        </p:nvSpPr>
-        <p:spPr>
-          <a:xfrm>
-            <a:off x="457200" y="3682080"/>
-            <a:ext cx="4015800" cy="1896840"/>
-          </a:xfrm>
-          <a:prstGeom prst="rect">
-            <a:avLst/>
-          </a:prstGeom>
-        </p:spPr>
-        <p:txBody>
-          <a:bodyPr lIns="0" rIns="0" tIns="0" bIns="0"/>
-          <a:p>
-            <a:endParaRPr/>
-          </a:p>
-        </p:txBody>
-      </p:sp>
-      <p:sp>
-        <p:nvSpPr>
-          <p:cNvPr id="125" name="PlaceHolder 4"/>
-          <p:cNvSpPr>
-            <a:spLocks noGrp="1"/>
-          </p:cNvSpPr>
-          <p:nvPr>
-            <p:ph type="body"/>
-          </p:nvPr>
-        </p:nvSpPr>
-        <p:spPr>
-          <a:xfrm>
-            <a:off x="4674240" y="1604520"/>
-            <a:ext cx="4015800" cy="3977280"/>
-          </a:xfrm>
-          <a:prstGeom prst="rect">
-            <a:avLst/>
-          </a:prstGeom>
-        </p:spPr>
-        <p:txBody>
-          <a:bodyPr lIns="0" rIns="0" tIns="0" bIns="0"/>
-          <a:p>
-            <a:endParaRPr/>
-          </a:p>
-        </p:txBody>
-      </p:sp>
-    </p:spTree>
-  </p:cSld>
-</p:sldLayout>
-</file>
-
-<file path=ppt/slideLayouts/slideLayout44.xml><?xml version="1.0" encoding="utf-8"?>
-<p:sldLayout xmlns:a="http://schemas.openxmlformats.org/drawingml/2006/main" xmlns:p="http://schemas.openxmlformats.org/presentationml/2006/main" xmlns:r="http://schemas.openxmlformats.org/officeDocument/2006/relationships" type="objAndTwoObj" preserve="1">
-  <p:cSld name="Title Content and 2 Content">
-    <p:spTree>
-      <p:nvGrpSpPr>
-        <p:cNvPr id="1" name=""/>
-        <p:cNvGrpSpPr/>
-        <p:nvPr/>
-      </p:nvGrpSpPr>
-      <p:grpSpPr>
-        <a:xfrm>
-          <a:off x="0" y="0"/>
-          <a:ext cx="0" cy="0"/>
-          <a:chOff x="0" y="0"/>
-          <a:chExt cx="0" cy="0"/>
-        </a:xfrm>
-      </p:grpSpPr>
-      <p:sp>
-        <p:nvSpPr>
-          <p:cNvPr id="126" name="PlaceHolder 1"/>
-          <p:cNvSpPr>
-            <a:spLocks noGrp="1"/>
-          </p:cNvSpPr>
-          <p:nvPr>
-            <p:ph type="title"/>
-          </p:nvPr>
-        </p:nvSpPr>
-        <p:spPr>
-          <a:xfrm>
-            <a:off x="457200" y="273600"/>
-            <a:ext cx="8229240" cy="1144800"/>
-          </a:xfrm>
-          <a:prstGeom prst="rect">
-            <a:avLst/>
-          </a:prstGeom>
-        </p:spPr>
-        <p:txBody>
-          <a:bodyPr lIns="0" rIns="0" tIns="0" bIns="0" anchor="ctr"/>
-          <a:p>
-            <a:pPr algn="ctr"/>
-            <a:endParaRPr/>
-          </a:p>
-        </p:txBody>
-      </p:sp>
-      <p:sp>
-        <p:nvSpPr>
-          <p:cNvPr id="127" name="PlaceHolder 2"/>
-          <p:cNvSpPr>
-            <a:spLocks noGrp="1"/>
-          </p:cNvSpPr>
-          <p:nvPr>
-            <p:ph type="body"/>
-          </p:nvPr>
-        </p:nvSpPr>
-        <p:spPr>
-          <a:xfrm>
-            <a:off x="457200" y="1604520"/>
-            <a:ext cx="4015800" cy="3977280"/>
-          </a:xfrm>
-          <a:prstGeom prst="rect">
-            <a:avLst/>
-          </a:prstGeom>
-        </p:spPr>
-        <p:txBody>
-          <a:bodyPr lIns="0" rIns="0" tIns="0" bIns="0"/>
-          <a:p>
-            <a:endParaRPr/>
-          </a:p>
-        </p:txBody>
-      </p:sp>
-      <p:sp>
-        <p:nvSpPr>
-          <p:cNvPr id="128" name="PlaceHolder 3"/>
-          <p:cNvSpPr>
-            <a:spLocks noGrp="1"/>
-          </p:cNvSpPr>
-          <p:nvPr>
-            <p:ph type="body"/>
-          </p:nvPr>
-        </p:nvSpPr>
-        <p:spPr>
-          <a:xfrm>
-            <a:off x="4674240" y="1604520"/>
-            <a:ext cx="4015800" cy="1896840"/>
-          </a:xfrm>
-          <a:prstGeom prst="rect">
-            <a:avLst/>
-          </a:prstGeom>
-        </p:spPr>
-        <p:txBody>
-          <a:bodyPr lIns="0" rIns="0" tIns="0" bIns="0"/>
-          <a:p>
-            <a:endParaRPr/>
-          </a:p>
-        </p:txBody>
-      </p:sp>
-      <p:sp>
-        <p:nvSpPr>
-          <p:cNvPr id="129" name="PlaceHolder 4"/>
-          <p:cNvSpPr>
-            <a:spLocks noGrp="1"/>
-          </p:cNvSpPr>
-          <p:nvPr>
-            <p:ph type="body"/>
-          </p:nvPr>
-        </p:nvSpPr>
-        <p:spPr>
-          <a:xfrm>
-            <a:off x="4674240" y="3682080"/>
-            <a:ext cx="4015800" cy="1896840"/>
-          </a:xfrm>
-          <a:prstGeom prst="rect">
-            <a:avLst/>
-          </a:prstGeom>
-        </p:spPr>
-        <p:txBody>
-          <a:bodyPr lIns="0" rIns="0" tIns="0" bIns="0"/>
-          <a:p>
-            <a:endParaRPr/>
-          </a:p>
-        </p:txBody>
-      </p:sp>
-    </p:spTree>
-  </p:cSld>
-</p:sldLayout>
-</file>
-
-<file path=ppt/slideLayouts/slideLayout45.xml><?xml version="1.0" encoding="utf-8"?>
-<p:sldLayout xmlns:a="http://schemas.openxmlformats.org/drawingml/2006/main" xmlns:p="http://schemas.openxmlformats.org/presentationml/2006/main" xmlns:r="http://schemas.openxmlformats.org/officeDocument/2006/relationships" type="twoObjOverTx" preserve="1">
-  <p:cSld name="Title, 2 Content over Content">
-    <p:spTree>
-      <p:nvGrpSpPr>
-        <p:cNvPr id="1" name=""/>
-        <p:cNvGrpSpPr/>
-        <p:nvPr/>
-      </p:nvGrpSpPr>
-      <p:grpSpPr>
-        <a:xfrm>
-          <a:off x="0" y="0"/>
-          <a:ext cx="0" cy="0"/>
-          <a:chOff x="0" y="0"/>
-          <a:chExt cx="0" cy="0"/>
-        </a:xfrm>
-      </p:grpSpPr>
-      <p:sp>
-        <p:nvSpPr>
-          <p:cNvPr id="130" name="PlaceHolder 1"/>
-          <p:cNvSpPr>
-            <a:spLocks noGrp="1"/>
-          </p:cNvSpPr>
-          <p:nvPr>
-            <p:ph type="title"/>
-          </p:nvPr>
-        </p:nvSpPr>
-        <p:spPr>
-          <a:xfrm>
-            <a:off x="457200" y="273600"/>
-            <a:ext cx="8229240" cy="1144800"/>
-          </a:xfrm>
-          <a:prstGeom prst="rect">
-            <a:avLst/>
-          </a:prstGeom>
-        </p:spPr>
-        <p:txBody>
-          <a:bodyPr lIns="0" rIns="0" tIns="0" bIns="0" anchor="ctr"/>
-          <a:p>
-            <a:pPr algn="ctr"/>
-            <a:endParaRPr/>
-          </a:p>
-        </p:txBody>
-      </p:sp>
-      <p:sp>
-        <p:nvSpPr>
-          <p:cNvPr id="131" name="PlaceHolder 2"/>
-          <p:cNvSpPr>
-            <a:spLocks noGrp="1"/>
-          </p:cNvSpPr>
-          <p:nvPr>
-            <p:ph type="body"/>
-          </p:nvPr>
-        </p:nvSpPr>
-        <p:spPr>
-          <a:xfrm>
-            <a:off x="457200" y="1604520"/>
-            <a:ext cx="4015800" cy="1896840"/>
-          </a:xfrm>
-          <a:prstGeom prst="rect">
-            <a:avLst/>
-          </a:prstGeom>
-        </p:spPr>
-        <p:txBody>
-          <a:bodyPr lIns="0" rIns="0" tIns="0" bIns="0"/>
-          <a:p>
-            <a:endParaRPr/>
-          </a:p>
-        </p:txBody>
-      </p:sp>
-      <p:sp>
-        <p:nvSpPr>
-          <p:cNvPr id="132" name="PlaceHolder 3"/>
-          <p:cNvSpPr>
-            <a:spLocks noGrp="1"/>
-          </p:cNvSpPr>
-          <p:nvPr>
-            <p:ph type="body"/>
-          </p:nvPr>
-        </p:nvSpPr>
-        <p:spPr>
-          <a:xfrm>
-            <a:off x="4674240" y="1604520"/>
-            <a:ext cx="4015800" cy="1896840"/>
-          </a:xfrm>
-          <a:prstGeom prst="rect">
-            <a:avLst/>
-          </a:prstGeom>
-        </p:spPr>
-        <p:txBody>
-          <a:bodyPr lIns="0" rIns="0" tIns="0" bIns="0"/>
-          <a:p>
-            <a:endParaRPr/>
-          </a:p>
-        </p:txBody>
-      </p:sp>
-      <p:sp>
-        <p:nvSpPr>
-          <p:cNvPr id="133" name="PlaceHolder 4"/>
-          <p:cNvSpPr>
-            <a:spLocks noGrp="1"/>
-          </p:cNvSpPr>
-          <p:nvPr>
-            <p:ph type="body"/>
-          </p:nvPr>
-        </p:nvSpPr>
-        <p:spPr>
-          <a:xfrm>
-            <a:off x="457200" y="3682080"/>
-            <a:ext cx="8229240" cy="1896840"/>
-          </a:xfrm>
-          <a:prstGeom prst="rect">
-            <a:avLst/>
-          </a:prstGeom>
-        </p:spPr>
-        <p:txBody>
-          <a:bodyPr lIns="0" rIns="0" tIns="0" bIns="0"/>
-          <a:p>
-            <a:endParaRPr/>
-          </a:p>
-        </p:txBody>
-      </p:sp>
-    </p:spTree>
-  </p:cSld>
-</p:sldLayout>
-</file>
-
-<file path=ppt/slideLayouts/slideLayout46.xml><?xml version="1.0" encoding="utf-8"?>
-<p:sldLayout xmlns:a="http://schemas.openxmlformats.org/drawingml/2006/main" xmlns:p="http://schemas.openxmlformats.org/presentationml/2006/main" xmlns:r="http://schemas.openxmlformats.org/officeDocument/2006/relationships" type="objOverTx" preserve="1">
-  <p:cSld name="Title, Content over Content">
-    <p:spTree>
-      <p:nvGrpSpPr>
-        <p:cNvPr id="1" name=""/>
-        <p:cNvGrpSpPr/>
-        <p:nvPr/>
-      </p:nvGrpSpPr>
-      <p:grpSpPr>
-        <a:xfrm>
-          <a:off x="0" y="0"/>
-          <a:ext cx="0" cy="0"/>
-          <a:chOff x="0" y="0"/>
-          <a:chExt cx="0" cy="0"/>
-        </a:xfrm>
-      </p:grpSpPr>
-      <p:sp>
-        <p:nvSpPr>
-          <p:cNvPr id="134" name="PlaceHolder 1"/>
-          <p:cNvSpPr>
-            <a:spLocks noGrp="1"/>
-          </p:cNvSpPr>
-          <p:nvPr>
-            <p:ph type="title"/>
-          </p:nvPr>
-        </p:nvSpPr>
-        <p:spPr>
-          <a:xfrm>
-            <a:off x="457200" y="273600"/>
-            <a:ext cx="8229240" cy="1144800"/>
-          </a:xfrm>
-          <a:prstGeom prst="rect">
-            <a:avLst/>
-          </a:prstGeom>
-        </p:spPr>
-        <p:txBody>
-          <a:bodyPr lIns="0" rIns="0" tIns="0" bIns="0" anchor="ctr"/>
-          <a:p>
-            <a:pPr algn="ctr"/>
-            <a:endParaRPr/>
-          </a:p>
-        </p:txBody>
-      </p:sp>
-      <p:sp>
-        <p:nvSpPr>
-          <p:cNvPr id="135" name="PlaceHolder 2"/>
-          <p:cNvSpPr>
-            <a:spLocks noGrp="1"/>
-          </p:cNvSpPr>
-          <p:nvPr>
-            <p:ph type="body"/>
-          </p:nvPr>
-        </p:nvSpPr>
-        <p:spPr>
-          <a:xfrm>
-            <a:off x="457200" y="1604520"/>
-            <a:ext cx="8229240" cy="1896840"/>
-          </a:xfrm>
-          <a:prstGeom prst="rect">
-            <a:avLst/>
-          </a:prstGeom>
-        </p:spPr>
-        <p:txBody>
-          <a:bodyPr lIns="0" rIns="0" tIns="0" bIns="0"/>
-          <a:p>
-            <a:endParaRPr/>
-          </a:p>
-        </p:txBody>
-      </p:sp>
-      <p:sp>
-        <p:nvSpPr>
-          <p:cNvPr id="136" name="PlaceHolder 3"/>
-          <p:cNvSpPr>
-            <a:spLocks noGrp="1"/>
-          </p:cNvSpPr>
-          <p:nvPr>
-            <p:ph type="body"/>
-          </p:nvPr>
-        </p:nvSpPr>
-        <p:spPr>
-          <a:xfrm>
-            <a:off x="457200" y="3682080"/>
-            <a:ext cx="8229240" cy="1896840"/>
-          </a:xfrm>
-          <a:prstGeom prst="rect">
-            <a:avLst/>
-          </a:prstGeom>
-        </p:spPr>
-        <p:txBody>
-          <a:bodyPr lIns="0" rIns="0" tIns="0" bIns="0"/>
-          <a:p>
-            <a:endParaRPr/>
-          </a:p>
-        </p:txBody>
-      </p:sp>
-    </p:spTree>
-  </p:cSld>
-</p:sldLayout>
-</file>
-
-<file path=ppt/slideLayouts/slideLayout47.xml><?xml version="1.0" encoding="utf-8"?>
-<p:sldLayout xmlns:a="http://schemas.openxmlformats.org/drawingml/2006/main" xmlns:p="http://schemas.openxmlformats.org/presentationml/2006/main" xmlns:r="http://schemas.openxmlformats.org/officeDocument/2006/relationships" type="fourObj" preserve="1">
-  <p:cSld name="Title, 4 Content">
-    <p:spTree>
-      <p:nvGrpSpPr>
-        <p:cNvPr id="1" name=""/>
-        <p:cNvGrpSpPr/>
-        <p:nvPr/>
-      </p:nvGrpSpPr>
-      <p:grpSpPr>
-        <a:xfrm>
-          <a:off x="0" y="0"/>
-          <a:ext cx="0" cy="0"/>
-          <a:chOff x="0" y="0"/>
-          <a:chExt cx="0" cy="0"/>
-        </a:xfrm>
-      </p:grpSpPr>
-      <p:sp>
-        <p:nvSpPr>
-          <p:cNvPr id="137" name="PlaceHolder 1"/>
-          <p:cNvSpPr>
-            <a:spLocks noGrp="1"/>
-          </p:cNvSpPr>
-          <p:nvPr>
-            <p:ph type="title"/>
-          </p:nvPr>
-        </p:nvSpPr>
-        <p:spPr>
-          <a:xfrm>
-            <a:off x="457200" y="273600"/>
-            <a:ext cx="8229240" cy="1144800"/>
-          </a:xfrm>
-          <a:prstGeom prst="rect">
-            <a:avLst/>
-          </a:prstGeom>
-        </p:spPr>
-        <p:txBody>
-          <a:bodyPr lIns="0" rIns="0" tIns="0" bIns="0" anchor="ctr"/>
-          <a:p>
-            <a:pPr algn="ctr"/>
-            <a:endParaRPr/>
-          </a:p>
-        </p:txBody>
-      </p:sp>
-      <p:sp>
-        <p:nvSpPr>
-          <p:cNvPr id="138" name="PlaceHolder 2"/>
-          <p:cNvSpPr>
-            <a:spLocks noGrp="1"/>
-          </p:cNvSpPr>
-          <p:nvPr>
-            <p:ph type="body"/>
-          </p:nvPr>
-        </p:nvSpPr>
-        <p:spPr>
-          <a:xfrm>
-            <a:off x="457200" y="1604520"/>
-            <a:ext cx="4015800" cy="1896840"/>
-          </a:xfrm>
-          <a:prstGeom prst="rect">
-            <a:avLst/>
-          </a:prstGeom>
-        </p:spPr>
-        <p:txBody>
-          <a:bodyPr lIns="0" rIns="0" tIns="0" bIns="0"/>
-          <a:p>
-            <a:endParaRPr/>
-          </a:p>
-        </p:txBody>
-      </p:sp>
-      <p:sp>
-        <p:nvSpPr>
-          <p:cNvPr id="139" name="PlaceHolder 3"/>
-          <p:cNvSpPr>
-            <a:spLocks noGrp="1"/>
-          </p:cNvSpPr>
-          <p:nvPr>
-            <p:ph type="body"/>
-          </p:nvPr>
-        </p:nvSpPr>
-        <p:spPr>
-          <a:xfrm>
-            <a:off x="4674240" y="1604520"/>
-            <a:ext cx="4015800" cy="1896840"/>
-          </a:xfrm>
-          <a:prstGeom prst="rect">
-            <a:avLst/>
-          </a:prstGeom>
-        </p:spPr>
-        <p:txBody>
-          <a:bodyPr lIns="0" rIns="0" tIns="0" bIns="0"/>
-          <a:p>
-            <a:endParaRPr/>
-          </a:p>
-        </p:txBody>
-      </p:sp>
-      <p:sp>
-        <p:nvSpPr>
-          <p:cNvPr id="140" name="PlaceHolder 4"/>
-          <p:cNvSpPr>
-            <a:spLocks noGrp="1"/>
-          </p:cNvSpPr>
-          <p:nvPr>
-            <p:ph type="body"/>
-          </p:nvPr>
-        </p:nvSpPr>
-        <p:spPr>
-          <a:xfrm>
-            <a:off x="4674240" y="3682080"/>
-            <a:ext cx="4015800" cy="1896840"/>
-          </a:xfrm>
-          <a:prstGeom prst="rect">
-            <a:avLst/>
-          </a:prstGeom>
-        </p:spPr>
-        <p:txBody>
-          <a:bodyPr lIns="0" rIns="0" tIns="0" bIns="0"/>
-          <a:p>
-            <a:endParaRPr/>
-          </a:p>
-        </p:txBody>
-      </p:sp>
-      <p:sp>
-        <p:nvSpPr>
-          <p:cNvPr id="141" name="PlaceHolder 5"/>
-          <p:cNvSpPr>
-            <a:spLocks noGrp="1"/>
-          </p:cNvSpPr>
-          <p:nvPr>
-            <p:ph type="body"/>
-          </p:nvPr>
-        </p:nvSpPr>
-        <p:spPr>
-          <a:xfrm>
-            <a:off x="457200" y="3682080"/>
-            <a:ext cx="4015800" cy="1896840"/>
-          </a:xfrm>
-          <a:prstGeom prst="rect">
-            <a:avLst/>
-          </a:prstGeom>
-        </p:spPr>
-        <p:txBody>
-          <a:bodyPr lIns="0" rIns="0" tIns="0" bIns="0"/>
-          <a:p>
-            <a:endParaRPr/>
-          </a:p>
-        </p:txBody>
-      </p:sp>
-    </p:spTree>
-  </p:cSld>
-</p:sldLayout>
-</file>
-
-<file path=ppt/slideLayouts/slideLayout48.xml><?xml version="1.0" encoding="utf-8"?>
-<p:sldLayout xmlns:a="http://schemas.openxmlformats.org/drawingml/2006/main" xmlns:p="http://schemas.openxmlformats.org/presentationml/2006/main" xmlns:r="http://schemas.openxmlformats.org/officeDocument/2006/relationships" type="blank" preserve="1">
-  <p:cSld name="Title, 6 Content">
-    <p:spTree>
-      <p:nvGrpSpPr>
-        <p:cNvPr id="1" name=""/>
-        <p:cNvGrpSpPr/>
-        <p:nvPr/>
-      </p:nvGrpSpPr>
-      <p:grpSpPr>
-        <a:xfrm>
-          <a:off x="0" y="0"/>
-          <a:ext cx="0" cy="0"/>
-          <a:chOff x="0" y="0"/>
-          <a:chExt cx="0" cy="0"/>
-        </a:xfrm>
-      </p:grpSpPr>
-      <p:sp>
-        <p:nvSpPr>
-          <p:cNvPr id="142" name="PlaceHolder 1"/>
-          <p:cNvSpPr>
-            <a:spLocks noGrp="1"/>
-          </p:cNvSpPr>
-          <p:nvPr>
-            <p:ph type="title"/>
-          </p:nvPr>
-        </p:nvSpPr>
-        <p:spPr>
-          <a:xfrm>
-            <a:off x="457200" y="273600"/>
-            <a:ext cx="8229240" cy="1144800"/>
-          </a:xfrm>
-          <a:prstGeom prst="rect">
-            <a:avLst/>
-          </a:prstGeom>
-        </p:spPr>
-        <p:txBody>
-          <a:bodyPr lIns="0" rIns="0" tIns="0" bIns="0" anchor="ctr"/>
-          <a:p>
-            <a:pPr algn="ctr"/>
-            <a:endParaRPr/>
-          </a:p>
-        </p:txBody>
-      </p:sp>
-      <p:sp>
-        <p:nvSpPr>
-          <p:cNvPr id="143" name="PlaceHolder 2"/>
-          <p:cNvSpPr>
-            <a:spLocks noGrp="1"/>
-          </p:cNvSpPr>
-          <p:nvPr>
-            <p:ph type="body"/>
-          </p:nvPr>
-        </p:nvSpPr>
-        <p:spPr>
-          <a:xfrm>
-            <a:off x="457200" y="1604520"/>
-            <a:ext cx="8229240" cy="3977280"/>
-          </a:xfrm>
-          <a:prstGeom prst="rect">
-            <a:avLst/>
-          </a:prstGeom>
-        </p:spPr>
-        <p:txBody>
-          <a:bodyPr lIns="0" rIns="0" tIns="0" bIns="0"/>
-          <a:p>
-            <a:endParaRPr/>
-          </a:p>
-        </p:txBody>
-      </p:sp>
-      <p:sp>
-        <p:nvSpPr>
-          <p:cNvPr id="144" name="PlaceHolder 3"/>
-          <p:cNvSpPr>
-            <a:spLocks noGrp="1"/>
-          </p:cNvSpPr>
-          <p:nvPr>
-            <p:ph type="body"/>
-          </p:nvPr>
-        </p:nvSpPr>
-        <p:spPr>
-          <a:xfrm>
-            <a:off x="457200" y="1604520"/>
-            <a:ext cx="8229240" cy="3977280"/>
-          </a:xfrm>
-          <a:prstGeom prst="rect">
-            <a:avLst/>
-          </a:prstGeom>
-        </p:spPr>
-        <p:txBody>
-          <a:bodyPr lIns="0" rIns="0" tIns="0" bIns="0"/>
-          <a:p>
-            <a:endParaRPr/>
-          </a:p>
-        </p:txBody>
-      </p:sp>
-      <p:pic>
-        <p:nvPicPr>
-          <p:cNvPr id="145" name="" descr=""/>
-          <p:cNvPicPr/>
-          <p:nvPr/>
-        </p:nvPicPr>
-        <p:blipFill>
-          <a:blip r:embed="rId2"/>
-          <a:stretch/>
-        </p:blipFill>
-        <p:spPr>
-          <a:xfrm>
-            <a:off x="2079000" y="1604520"/>
-            <a:ext cx="4984920" cy="3977280"/>
-          </a:xfrm>
-          <a:prstGeom prst="rect">
-            <a:avLst/>
-          </a:prstGeom>
-          <a:ln>
-            <a:noFill/>
-          </a:ln>
-        </p:spPr>
-      </p:pic>
-      <p:pic>
-        <p:nvPicPr>
-          <p:cNvPr id="146" name="" descr=""/>
-          <p:cNvPicPr/>
-          <p:nvPr/>
-        </p:nvPicPr>
-        <p:blipFill>
-          <a:blip r:embed="rId3"/>
-          <a:stretch/>
-        </p:blipFill>
-        <p:spPr>
-          <a:xfrm>
-            <a:off x="2079000" y="1604520"/>
-            <a:ext cx="4984920" cy="3977280"/>
-          </a:xfrm>
-          <a:prstGeom prst="rect">
-            <a:avLst/>
-          </a:prstGeom>
-          <a:ln>
-            <a:noFill/>
-          </a:ln>
-        </p:spPr>
-      </p:pic>
     </p:spTree>
   </p:cSld>
 </p:sldLayout>
@@ -4685,7 +3530,7 @@
         <p:spPr>
           <a:xfrm>
             <a:off x="457200" y="273600"/>
-            <a:ext cx="8228880" cy="1144440"/>
+            <a:ext cx="8229240" cy="1144800"/>
           </a:xfrm>
           <a:prstGeom prst="rect">
             <a:avLst/>
@@ -4694,8 +3539,9 @@
         <p:txBody>
           <a:bodyPr lIns="0" rIns="0" tIns="0" bIns="0" anchor="ctr"/>
           <a:p>
-            <a:r>
-              <a:rPr lang="en-GB">
+            <a:pPr algn="ctr"/>
+            <a:r>
+              <a:rPr lang="en-GB" sz="4400">
                 <a:latin typeface="Arial"/>
               </a:rPr>
               <a:t>Click to edit the title text format</a:t>
@@ -4717,7 +3563,7 @@
         <p:spPr>
           <a:xfrm>
             <a:off x="457200" y="1604520"/>
-            <a:ext cx="8228880" cy="3976920"/>
+            <a:ext cx="8229240" cy="3977280"/>
           </a:xfrm>
           <a:prstGeom prst="rect">
             <a:avLst/>
@@ -4732,7 +3578,7 @@
               <a:buChar char=""/>
             </a:pPr>
             <a:r>
-              <a:rPr lang="en-GB">
+              <a:rPr lang="en-GB" sz="3200">
                 <a:latin typeface="Arial"/>
               </a:rPr>
               <a:t>Click to edit the outline text format</a:t>
@@ -4746,7 +3592,7 @@
               <a:buChar char=""/>
             </a:pPr>
             <a:r>
-              <a:rPr lang="en-GB">
+              <a:rPr lang="en-GB" sz="2800">
                 <a:latin typeface="Arial"/>
               </a:rPr>
               <a:t>Second Outline Level</a:t>
@@ -4760,7 +3606,7 @@
               <a:buChar char=""/>
             </a:pPr>
             <a:r>
-              <a:rPr lang="en-GB">
+              <a:rPr lang="en-GB" sz="2400">
                 <a:latin typeface="Arial"/>
               </a:rPr>
               <a:t>Third Outline Level</a:t>
@@ -4774,7 +3620,7 @@
               <a:buChar char=""/>
             </a:pPr>
             <a:r>
-              <a:rPr lang="en-GB">
+              <a:rPr lang="en-GB" sz="2000">
                 <a:latin typeface="Arial"/>
               </a:rPr>
               <a:t>Fourth Outline Level</a:t>
@@ -4788,7 +3634,7 @@
               <a:buChar char=""/>
             </a:pPr>
             <a:r>
-              <a:rPr lang="en-GB">
+              <a:rPr lang="en-GB" sz="2000">
                 <a:latin typeface="Arial"/>
               </a:rPr>
               <a:t>Fifth Outline Level</a:t>
@@ -4802,7 +3648,7 @@
               <a:buChar char=""/>
             </a:pPr>
             <a:r>
-              <a:rPr lang="en-GB">
+              <a:rPr lang="en-GB" sz="2000">
                 <a:latin typeface="Arial"/>
               </a:rPr>
               <a:t>Sixth Outline Level</a:t>
@@ -4816,7 +3662,7 @@
               <a:buChar char=""/>
             </a:pPr>
             <a:r>
-              <a:rPr lang="en-GB">
+              <a:rPr lang="en-GB" sz="2000">
                 <a:latin typeface="Arial"/>
               </a:rPr>
               <a:t>Seventh Outline Level</a:t>
@@ -5247,305 +4093,6 @@
 </p:sldMaster>
 </file>
 
-<file path=ppt/slideMasters/slideMaster4.xml><?xml version="1.0" encoding="utf-8"?>
-<p:sldMaster xmlns:a="http://schemas.openxmlformats.org/drawingml/2006/main" xmlns:p="http://schemas.openxmlformats.org/presentationml/2006/main" xmlns:r="http://schemas.openxmlformats.org/officeDocument/2006/relationships">
-  <p:cSld>
-    <p:bg>
-      <p:bgPr>
-        <a:blipFill>
-          <a:blip r:embed="rId2"/>
-          <a:stretch>
-            <a:fillRect/>
-          </a:stretch>
-        </a:blipFill>
-      </p:bgPr>
-    </p:bg>
-    <p:spTree>
-      <p:nvGrpSpPr>
-        <p:cNvPr id="1" name=""/>
-        <p:cNvGrpSpPr/>
-        <p:nvPr/>
-      </p:nvGrpSpPr>
-      <p:grpSpPr>
-        <a:xfrm>
-          <a:off x="0" y="0"/>
-          <a:ext cx="0" cy="0"/>
-          <a:chOff x="0" y="0"/>
-          <a:chExt cx="0" cy="0"/>
-        </a:xfrm>
-      </p:grpSpPr>
-      <p:sp>
-        <p:nvSpPr>
-          <p:cNvPr id="108" name="PlaceHolder 1"/>
-          <p:cNvSpPr>
-            <a:spLocks noGrp="1"/>
-          </p:cNvSpPr>
-          <p:nvPr>
-            <p:ph type="title"/>
-          </p:nvPr>
-        </p:nvSpPr>
-        <p:spPr>
-          <a:xfrm>
-            <a:off x="457200" y="273600"/>
-            <a:ext cx="8229240" cy="1144800"/>
-          </a:xfrm>
-          <a:prstGeom prst="rect">
-            <a:avLst/>
-          </a:prstGeom>
-        </p:spPr>
-        <p:txBody>
-          <a:bodyPr lIns="0" rIns="0" tIns="0" bIns="0" anchor="ctr"/>
-          <a:p>
-            <a:pPr algn="ctr"/>
-            <a:r>
-              <a:rPr lang="en-GB" sz="4400">
-                <a:latin typeface="Arial"/>
-              </a:rPr>
-              <a:t>Click to edit the title text format</a:t>
-            </a:r>
-            <a:endParaRPr/>
-          </a:p>
-        </p:txBody>
-      </p:sp>
-      <p:sp>
-        <p:nvSpPr>
-          <p:cNvPr id="109" name="PlaceHolder 2"/>
-          <p:cNvSpPr>
-            <a:spLocks noGrp="1"/>
-          </p:cNvSpPr>
-          <p:nvPr>
-            <p:ph type="body"/>
-          </p:nvPr>
-        </p:nvSpPr>
-        <p:spPr>
-          <a:xfrm>
-            <a:off x="457200" y="1604520"/>
-            <a:ext cx="8229240" cy="3977280"/>
-          </a:xfrm>
-          <a:prstGeom prst="rect">
-            <a:avLst/>
-          </a:prstGeom>
-        </p:spPr>
-        <p:txBody>
-          <a:bodyPr lIns="0" rIns="0" tIns="0" bIns="0"/>
-          <a:p>
-            <a:pPr>
-              <a:buSzPct val="45000"/>
-              <a:buFont typeface="StarSymbol"/>
-              <a:buChar char=""/>
-            </a:pPr>
-            <a:r>
-              <a:rPr lang="en-GB" sz="3200">
-                <a:latin typeface="Arial"/>
-              </a:rPr>
-              <a:t>Click to edit the outline text format</a:t>
-            </a:r>
-            <a:endParaRPr/>
-          </a:p>
-          <a:p>
-            <a:pPr lvl="1">
-              <a:buSzPct val="75000"/>
-              <a:buFont typeface="StarSymbol"/>
-              <a:buChar char=""/>
-            </a:pPr>
-            <a:r>
-              <a:rPr lang="en-GB" sz="2800">
-                <a:latin typeface="Arial"/>
-              </a:rPr>
-              <a:t>Second Outline Level</a:t>
-            </a:r>
-            <a:endParaRPr/>
-          </a:p>
-          <a:p>
-            <a:pPr lvl="2">
-              <a:buSzPct val="45000"/>
-              <a:buFont typeface="StarSymbol"/>
-              <a:buChar char=""/>
-            </a:pPr>
-            <a:r>
-              <a:rPr lang="en-GB" sz="2400">
-                <a:latin typeface="Arial"/>
-              </a:rPr>
-              <a:t>Third Outline Level</a:t>
-            </a:r>
-            <a:endParaRPr/>
-          </a:p>
-          <a:p>
-            <a:pPr lvl="3">
-              <a:buSzPct val="75000"/>
-              <a:buFont typeface="StarSymbol"/>
-              <a:buChar char=""/>
-            </a:pPr>
-            <a:r>
-              <a:rPr lang="en-GB" sz="2000">
-                <a:latin typeface="Arial"/>
-              </a:rPr>
-              <a:t>Fourth Outline Level</a:t>
-            </a:r>
-            <a:endParaRPr/>
-          </a:p>
-          <a:p>
-            <a:pPr lvl="4">
-              <a:buSzPct val="45000"/>
-              <a:buFont typeface="StarSymbol"/>
-              <a:buChar char=""/>
-            </a:pPr>
-            <a:r>
-              <a:rPr lang="en-GB" sz="2000">
-                <a:latin typeface="Arial"/>
-              </a:rPr>
-              <a:t>Fifth Outline Level</a:t>
-            </a:r>
-            <a:endParaRPr/>
-          </a:p>
-          <a:p>
-            <a:pPr lvl="5">
-              <a:buSzPct val="45000"/>
-              <a:buFont typeface="StarSymbol"/>
-              <a:buChar char=""/>
-            </a:pPr>
-            <a:r>
-              <a:rPr lang="en-GB" sz="2000">
-                <a:latin typeface="Arial"/>
-              </a:rPr>
-              <a:t>Sixth Outline Level</a:t>
-            </a:r>
-            <a:endParaRPr/>
-          </a:p>
-          <a:p>
-            <a:pPr lvl="6">
-              <a:buSzPct val="45000"/>
-              <a:buFont typeface="StarSymbol"/>
-              <a:buChar char=""/>
-            </a:pPr>
-            <a:r>
-              <a:rPr lang="en-GB" sz="2000">
-                <a:latin typeface="Arial"/>
-              </a:rPr>
-              <a:t>Seventh Outline Level</a:t>
-            </a:r>
-            <a:endParaRPr/>
-          </a:p>
-        </p:txBody>
-      </p:sp>
-      <p:sp>
-        <p:nvSpPr>
-          <p:cNvPr id="110" name="PlaceHolder 3"/>
-          <p:cNvSpPr>
-            <a:spLocks noGrp="1"/>
-          </p:cNvSpPr>
-          <p:nvPr>
-            <p:ph type="dt"/>
-          </p:nvPr>
-        </p:nvSpPr>
-        <p:spPr>
-          <a:xfrm>
-            <a:off x="457200" y="6247440"/>
-            <a:ext cx="2130120" cy="472680"/>
-          </a:xfrm>
-          <a:prstGeom prst="rect">
-            <a:avLst/>
-          </a:prstGeom>
-        </p:spPr>
-        <p:txBody>
-          <a:bodyPr lIns="0" rIns="0" tIns="0" bIns="0"/>
-          <a:p>
-            <a:r>
-              <a:rPr lang="en-GB" sz="1400">
-                <a:latin typeface="Times New Roman"/>
-              </a:rPr>
-              <a:t>&lt;date/time&gt;</a:t>
-            </a:r>
-            <a:endParaRPr/>
-          </a:p>
-        </p:txBody>
-      </p:sp>
-      <p:sp>
-        <p:nvSpPr>
-          <p:cNvPr id="111" name="PlaceHolder 4"/>
-          <p:cNvSpPr>
-            <a:spLocks noGrp="1"/>
-          </p:cNvSpPr>
-          <p:nvPr>
-            <p:ph type="ftr"/>
-          </p:nvPr>
-        </p:nvSpPr>
-        <p:spPr>
-          <a:xfrm>
-            <a:off x="3126960" y="6247440"/>
-            <a:ext cx="2898000" cy="472680"/>
-          </a:xfrm>
-          <a:prstGeom prst="rect">
-            <a:avLst/>
-          </a:prstGeom>
-        </p:spPr>
-        <p:txBody>
-          <a:bodyPr lIns="0" rIns="0" tIns="0" bIns="0"/>
-          <a:p>
-            <a:pPr algn="ctr"/>
-            <a:r>
-              <a:rPr lang="en-GB" sz="1400">
-                <a:latin typeface="Times New Roman"/>
-              </a:rPr>
-              <a:t>&lt;footer&gt;</a:t>
-            </a:r>
-            <a:endParaRPr/>
-          </a:p>
-        </p:txBody>
-      </p:sp>
-      <p:sp>
-        <p:nvSpPr>
-          <p:cNvPr id="112" name="PlaceHolder 5"/>
-          <p:cNvSpPr>
-            <a:spLocks noGrp="1"/>
-          </p:cNvSpPr>
-          <p:nvPr>
-            <p:ph type="sldNum"/>
-          </p:nvPr>
-        </p:nvSpPr>
-        <p:spPr>
-          <a:xfrm>
-            <a:off x="6555960" y="6247440"/>
-            <a:ext cx="2130120" cy="472680"/>
-          </a:xfrm>
-          <a:prstGeom prst="rect">
-            <a:avLst/>
-          </a:prstGeom>
-        </p:spPr>
-        <p:txBody>
-          <a:bodyPr lIns="0" rIns="0" tIns="0" bIns="0"/>
-          <a:p>
-            <a:pPr algn="r"/>
-            <a:fld id="{12047872-C5A4-45D8-A0E2-7FDD7C4C260C}" type="slidenum">
-              <a:rPr lang="en-GB" sz="1400">
-                <a:latin typeface="Times New Roman"/>
-              </a:rPr>
-              <a:t>&lt;number&gt;</a:t>
-            </a:fld>
-            <a:endParaRPr/>
-          </a:p>
-        </p:txBody>
-      </p:sp>
-    </p:spTree>
-  </p:cSld>
-  <p:clrMap bg1="lt1" bg2="lt2" tx1="dk1" tx2="dk2" accent1="accent1" accent2="accent2" accent3="accent3" accent4="accent4" accent5="accent5" accent6="accent6" hlink="hlink" folHlink="folHlink"/>
-  <p:sldLayoutIdLst>
-    <p:sldLayoutId id="2147483688" r:id="rId3"/>
-    <p:sldLayoutId id="2147483689" r:id="rId4"/>
-    <p:sldLayoutId id="2147483690" r:id="rId5"/>
-    <p:sldLayoutId id="2147483691" r:id="rId6"/>
-    <p:sldLayoutId id="2147483692" r:id="rId7"/>
-    <p:sldLayoutId id="2147483693" r:id="rId8"/>
-    <p:sldLayoutId id="2147483694" r:id="rId9"/>
-    <p:sldLayoutId id="2147483695" r:id="rId10"/>
-    <p:sldLayoutId id="2147483696" r:id="rId11"/>
-    <p:sldLayoutId id="2147483697" r:id="rId12"/>
-    <p:sldLayoutId id="2147483698" r:id="rId13"/>
-    <p:sldLayoutId id="2147483699" r:id="rId14"/>
-  </p:sldLayoutIdLst>
-</p:sldMaster>
-</file>
-
 <file path=ppt/slides/slide1.xml><?xml version="1.0" encoding="utf-8"?>
 <p:sld xmlns:a="http://schemas.openxmlformats.org/drawingml/2006/main" xmlns:p="http://schemas.openxmlformats.org/presentationml/2006/main" xmlns:r="http://schemas.openxmlformats.org/officeDocument/2006/relationships">
   <p:cSld>
@@ -5565,14 +4112,14 @@
       </p:grpSpPr>
       <p:sp>
         <p:nvSpPr>
-          <p:cNvPr id="147" name="CustomShape 1"/>
+          <p:cNvPr id="108" name="CustomShape 1"/>
           <p:cNvSpPr/>
           <p:nvPr/>
         </p:nvSpPr>
         <p:spPr>
           <a:xfrm>
             <a:off x="685800" y="2130480"/>
-            <a:ext cx="7771320" cy="1468800"/>
+            <a:ext cx="7770960" cy="1468440"/>
           </a:xfrm>
           <a:prstGeom prst="rect">
             <a:avLst/>
@@ -5612,14 +4159,14 @@
       </p:sp>
       <p:sp>
         <p:nvSpPr>
-          <p:cNvPr id="148" name="CustomShape 2"/>
+          <p:cNvPr id="109" name="CustomShape 2"/>
           <p:cNvSpPr/>
           <p:nvPr/>
         </p:nvSpPr>
         <p:spPr>
           <a:xfrm>
             <a:off x="1371600" y="3886200"/>
-            <a:ext cx="6399720" cy="1751400"/>
+            <a:ext cx="6399360" cy="1751040"/>
           </a:xfrm>
           <a:prstGeom prst="rect">
             <a:avLst/>
@@ -5708,14 +4255,14 @@
       </p:grpSpPr>
       <p:sp>
         <p:nvSpPr>
-          <p:cNvPr id="167" name="CustomShape 1"/>
+          <p:cNvPr id="128" name="CustomShape 1"/>
           <p:cNvSpPr/>
           <p:nvPr/>
         </p:nvSpPr>
         <p:spPr>
           <a:xfrm>
             <a:off x="838080" y="685800"/>
-            <a:ext cx="8228520" cy="1141920"/>
+            <a:ext cx="8228160" cy="1141560"/>
           </a:xfrm>
           <a:prstGeom prst="rect">
             <a:avLst/>
@@ -5755,14 +4302,14 @@
       </p:sp>
       <p:sp>
         <p:nvSpPr>
-          <p:cNvPr id="168" name="CustomShape 2"/>
+          <p:cNvPr id="129" name="CustomShape 2"/>
           <p:cNvSpPr/>
           <p:nvPr/>
         </p:nvSpPr>
         <p:spPr>
           <a:xfrm>
             <a:off x="762120" y="1676520"/>
-            <a:ext cx="7847640" cy="4524840"/>
+            <a:ext cx="7847280" cy="4524480"/>
           </a:xfrm>
           <a:prstGeom prst="rect">
             <a:avLst/>
@@ -5787,7 +4334,7 @@
               </a:lnSpc>
               <a:buSzPct val="45000"/>
               <a:buFont typeface="StarSymbol"/>
-              <a:buChar char=""/>
+              <a:buChar char="l"/>
             </a:pPr>
             <a:r>
               <a:rPr lang="en-GB" sz="3200" strike="noStrike">
@@ -5826,9 +4373,6 @@
               <a:lnSpc>
                 <a:spcPct val="100000"/>
               </a:lnSpc>
-              <a:buSzPct val="45000"/>
-              <a:buFont typeface="StarSymbol"/>
-              <a:buChar char=""/>
             </a:pPr>
             <a:endParaRPr/>
           </a:p>
@@ -5836,7 +4380,7 @@
       </p:sp>
       <p:pic>
         <p:nvPicPr>
-          <p:cNvPr id="169" name="" descr=""/>
+          <p:cNvPr id="130" name="" descr=""/>
           <p:cNvPicPr/>
           <p:nvPr/>
         </p:nvPicPr>
@@ -5847,7 +4391,7 @@
         <p:spPr>
           <a:xfrm>
             <a:off x="3816000" y="2554200"/>
-            <a:ext cx="4392000" cy="3781800"/>
+            <a:ext cx="4391640" cy="3781440"/>
           </a:xfrm>
           <a:prstGeom prst="rect">
             <a:avLst/>
@@ -5908,14 +4452,14 @@
       </p:grpSpPr>
       <p:sp>
         <p:nvSpPr>
-          <p:cNvPr id="170" name="CustomShape 1"/>
+          <p:cNvPr id="131" name="CustomShape 1"/>
           <p:cNvSpPr/>
           <p:nvPr/>
         </p:nvSpPr>
         <p:spPr>
           <a:xfrm>
             <a:off x="838080" y="685800"/>
-            <a:ext cx="8228520" cy="1141920"/>
+            <a:ext cx="8228160" cy="1141560"/>
           </a:xfrm>
           <a:prstGeom prst="rect">
             <a:avLst/>
@@ -5955,14 +4499,14 @@
       </p:sp>
       <p:sp>
         <p:nvSpPr>
-          <p:cNvPr id="171" name="CustomShape 2"/>
+          <p:cNvPr id="132" name="CustomShape 2"/>
           <p:cNvSpPr/>
           <p:nvPr/>
         </p:nvSpPr>
         <p:spPr>
           <a:xfrm>
             <a:off x="762120" y="1676520"/>
-            <a:ext cx="7847640" cy="4524840"/>
+            <a:ext cx="7847280" cy="4524480"/>
           </a:xfrm>
           <a:prstGeom prst="rect">
             <a:avLst/>
@@ -5987,7 +4531,7 @@
               </a:lnSpc>
               <a:buSzPct val="45000"/>
               <a:buFont typeface="StarSymbol"/>
-              <a:buChar char=""/>
+              <a:buChar char="l"/>
             </a:pPr>
             <a:r>
               <a:rPr lang="en-GB" sz="3200" strike="noStrike">
@@ -6008,7 +4552,7 @@
               </a:lnSpc>
               <a:buSzPct val="45000"/>
               <a:buFont typeface="StarSymbol"/>
-              <a:buChar char=""/>
+              <a:buChar char="l"/>
             </a:pPr>
             <a:r>
               <a:rPr lang="en-GB" sz="3200" strike="noStrike">
@@ -6029,7 +4573,7 @@
               </a:lnSpc>
               <a:buSzPct val="45000"/>
               <a:buFont typeface="StarSymbol"/>
-              <a:buChar char=""/>
+              <a:buChar char="l"/>
             </a:pPr>
             <a:r>
               <a:rPr lang="en-GB" sz="3200" strike="noStrike">
@@ -6050,7 +4594,7 @@
               </a:lnSpc>
               <a:buSzPct val="45000"/>
               <a:buFont typeface="StarSymbol"/>
-              <a:buChar char=""/>
+              <a:buChar char="l"/>
             </a:pPr>
             <a:r>
               <a:rPr lang="en-GB" sz="3200" strike="noStrike">
@@ -6071,7 +4615,7 @@
               </a:lnSpc>
               <a:buSzPct val="45000"/>
               <a:buFont typeface="StarSymbol"/>
-              <a:buChar char=""/>
+              <a:buChar char="l"/>
             </a:pPr>
             <a:r>
               <a:rPr lang="en-GB" sz="3200" strike="noStrike">
@@ -6090,9 +4634,6 @@
               <a:lnSpc>
                 <a:spcPct val="100000"/>
               </a:lnSpc>
-              <a:buSzPct val="45000"/>
-              <a:buFont typeface="StarSymbol"/>
-              <a:buChar char=""/>
             </a:pPr>
             <a:endParaRPr/>
           </a:p>
@@ -6149,14 +4690,14 @@
       </p:grpSpPr>
       <p:sp>
         <p:nvSpPr>
-          <p:cNvPr id="172" name="CustomShape 1"/>
+          <p:cNvPr id="133" name="CustomShape 1"/>
           <p:cNvSpPr/>
           <p:nvPr/>
         </p:nvSpPr>
         <p:spPr>
           <a:xfrm>
             <a:off x="838080" y="685800"/>
-            <a:ext cx="8228520" cy="1141920"/>
+            <a:ext cx="8228160" cy="1141560"/>
           </a:xfrm>
           <a:prstGeom prst="rect">
             <a:avLst/>
@@ -6196,14 +4737,14 @@
       </p:sp>
       <p:sp>
         <p:nvSpPr>
-          <p:cNvPr id="173" name="CustomShape 2"/>
+          <p:cNvPr id="134" name="CustomShape 2"/>
           <p:cNvSpPr/>
           <p:nvPr/>
         </p:nvSpPr>
         <p:spPr>
           <a:xfrm>
             <a:off x="762120" y="1676520"/>
-            <a:ext cx="7847640" cy="4524840"/>
+            <a:ext cx="7847280" cy="4524480"/>
           </a:xfrm>
           <a:prstGeom prst="rect">
             <a:avLst/>
@@ -6228,7 +4769,7 @@
               </a:lnSpc>
               <a:buSzPct val="45000"/>
               <a:buFont typeface="StarSymbol"/>
-              <a:buChar char=""/>
+              <a:buChar char="l"/>
             </a:pPr>
             <a:r>
               <a:rPr lang="en-GB" sz="3200" strike="noStrike">
@@ -6249,7 +4790,7 @@
               </a:lnSpc>
               <a:buSzPct val="45000"/>
               <a:buFont typeface="StarSymbol"/>
-              <a:buChar char=""/>
+              <a:buChar char="l"/>
             </a:pPr>
             <a:r>
               <a:rPr lang="en-GB" sz="3200" strike="noStrike">
@@ -6270,7 +4811,7 @@
               </a:lnSpc>
               <a:buSzPct val="45000"/>
               <a:buFont typeface="StarSymbol"/>
-              <a:buChar char=""/>
+              <a:buChar char="l"/>
             </a:pPr>
             <a:r>
               <a:rPr lang="en-GB" sz="3200" strike="noStrike">
@@ -6291,7 +4832,7 @@
               </a:lnSpc>
               <a:buSzPct val="45000"/>
               <a:buFont typeface="StarSymbol"/>
-              <a:buChar char=""/>
+              <a:buChar char="l"/>
             </a:pPr>
             <a:r>
               <a:rPr lang="en-GB" sz="3200" strike="noStrike">
@@ -6312,7 +4853,7 @@
               </a:lnSpc>
               <a:buSzPct val="45000"/>
               <a:buFont typeface="StarSymbol"/>
-              <a:buChar char=""/>
+              <a:buChar char="l"/>
             </a:pPr>
             <a:r>
               <a:rPr lang="en-GB" sz="3200" strike="noStrike">
@@ -6333,7 +4874,7 @@
               </a:lnSpc>
               <a:buSzPct val="45000"/>
               <a:buFont typeface="StarSymbol"/>
-              <a:buChar char=""/>
+              <a:buChar char="l"/>
             </a:pPr>
             <a:r>
               <a:rPr lang="en-GB" sz="3200" strike="noStrike">
@@ -6354,7 +4895,7 @@
               </a:lnSpc>
               <a:buSzPct val="45000"/>
               <a:buFont typeface="StarSymbol"/>
-              <a:buChar char=""/>
+              <a:buChar char="l"/>
             </a:pPr>
             <a:r>
               <a:rPr lang="en-GB" sz="3200" strike="noStrike">
@@ -6375,7 +4916,7 @@
               </a:lnSpc>
               <a:buSzPct val="45000"/>
               <a:buFont typeface="StarSymbol"/>
-              <a:buChar char=""/>
+              <a:buChar char="l"/>
             </a:pPr>
             <a:r>
               <a:rPr lang="en-GB" sz="3200" strike="noStrike">
@@ -6394,9 +4935,6 @@
               <a:lnSpc>
                 <a:spcPct val="100000"/>
               </a:lnSpc>
-              <a:buSzPct val="45000"/>
-              <a:buFont typeface="StarSymbol"/>
-              <a:buChar char=""/>
             </a:pPr>
             <a:endParaRPr/>
           </a:p>
@@ -6405,9 +4943,6 @@
               <a:lnSpc>
                 <a:spcPct val="100000"/>
               </a:lnSpc>
-              <a:buSzPct val="45000"/>
-              <a:buFont typeface="StarSymbol"/>
-              <a:buChar char=""/>
             </a:pPr>
             <a:endParaRPr/>
           </a:p>
@@ -6464,14 +4999,14 @@
       </p:grpSpPr>
       <p:sp>
         <p:nvSpPr>
-          <p:cNvPr id="174" name="CustomShape 1"/>
+          <p:cNvPr id="135" name="CustomShape 1"/>
           <p:cNvSpPr/>
           <p:nvPr/>
         </p:nvSpPr>
         <p:spPr>
           <a:xfrm>
             <a:off x="838080" y="685800"/>
-            <a:ext cx="8228520" cy="1141920"/>
+            <a:ext cx="8228160" cy="1141560"/>
           </a:xfrm>
           <a:prstGeom prst="rect">
             <a:avLst/>
@@ -6511,14 +5046,14 @@
       </p:sp>
       <p:sp>
         <p:nvSpPr>
-          <p:cNvPr id="175" name="CustomShape 2"/>
+          <p:cNvPr id="136" name="CustomShape 2"/>
           <p:cNvSpPr/>
           <p:nvPr/>
         </p:nvSpPr>
         <p:spPr>
           <a:xfrm>
             <a:off x="762120" y="1676520"/>
-            <a:ext cx="7619040" cy="4524840"/>
+            <a:ext cx="7618680" cy="4524480"/>
           </a:xfrm>
           <a:prstGeom prst="rect">
             <a:avLst/>
@@ -6572,7 +5107,7 @@
       </p:sp>
       <p:pic>
         <p:nvPicPr>
-          <p:cNvPr id="176" name="Picture 3" descr=""/>
+          <p:cNvPr id="137" name="Picture 3" descr=""/>
           <p:cNvPicPr/>
           <p:nvPr/>
         </p:nvPicPr>
@@ -6583,7 +5118,7 @@
         <p:spPr>
           <a:xfrm>
             <a:off x="3505320" y="2057400"/>
-            <a:ext cx="2418120" cy="2418120"/>
+            <a:ext cx="2417760" cy="2417760"/>
           </a:xfrm>
           <a:prstGeom prst="rect">
             <a:avLst/>
@@ -6644,14 +5179,14 @@
       </p:grpSpPr>
       <p:sp>
         <p:nvSpPr>
-          <p:cNvPr id="177" name="CustomShape 1"/>
+          <p:cNvPr id="138" name="CustomShape 1"/>
           <p:cNvSpPr/>
           <p:nvPr/>
         </p:nvSpPr>
         <p:spPr>
           <a:xfrm>
             <a:off x="838080" y="685800"/>
-            <a:ext cx="8228520" cy="1141920"/>
+            <a:ext cx="8228160" cy="1141560"/>
           </a:xfrm>
           <a:prstGeom prst="rect">
             <a:avLst/>
@@ -6691,14 +5226,14 @@
       </p:sp>
       <p:sp>
         <p:nvSpPr>
-          <p:cNvPr id="178" name="CustomShape 2"/>
+          <p:cNvPr id="139" name="CustomShape 2"/>
           <p:cNvSpPr/>
           <p:nvPr/>
         </p:nvSpPr>
         <p:spPr>
           <a:xfrm>
             <a:off x="762120" y="1676520"/>
-            <a:ext cx="7847640" cy="4524840"/>
+            <a:ext cx="7847280" cy="4524480"/>
           </a:xfrm>
           <a:prstGeom prst="rect">
             <a:avLst/>
@@ -6742,8 +5277,18 @@
                 <a:latin typeface="Calibri"/>
                 <a:ea typeface="DejaVu Sans"/>
               </a:rPr>
-              <a:t>Изтествайте съвместимостта на </a:t>
-            </a:r>
+              <a:t>Изтествайте съвместимостта на http://www.medenka.com със следните устройства и браузъри:</a:t>
+            </a:r>
+            <a:endParaRPr/>
+          </a:p>
+          <a:p>
+            <a:pPr lvl="2">
+              <a:lnSpc>
+                <a:spcPct val="100000"/>
+              </a:lnSpc>
+              <a:buFont typeface="Liberation Serif"/>
+              <a:buAutoNum type="arabicPeriod"/>
+            </a:pPr>
             <a:r>
               <a:rPr lang="en-GB" sz="3200" strike="noStrike">
                 <a:solidFill>
@@ -6752,7 +5297,7 @@
                 <a:latin typeface="Calibri"/>
                 <a:ea typeface="DejaVu Sans"/>
               </a:rPr>
-              <a:t>http://www.medenka.com</a:t>
+              <a:t> </a:t>
             </a:r>
             <a:r>
               <a:rPr lang="en-GB" sz="3200" strike="noStrike">
@@ -6762,7 +5307,7 @@
                 <a:latin typeface="Calibri"/>
                 <a:ea typeface="DejaVu Sans"/>
               </a:rPr>
-              <a:t> със следните устройства и браузъри:</a:t>
+              <a:t>Internet Explorer 8 и 9 съответно на Windows XP и Windows 7.</a:t>
             </a:r>
             <a:endParaRPr/>
           </a:p>
@@ -6792,36 +5337,6 @@
                 <a:latin typeface="Calibri"/>
                 <a:ea typeface="DejaVu Sans"/>
               </a:rPr>
-              <a:t>Internet Explorer 8 и 9 съответно на Windows XP и Windows 7.</a:t>
-            </a:r>
-            <a:endParaRPr/>
-          </a:p>
-          <a:p>
-            <a:pPr lvl="2">
-              <a:lnSpc>
-                <a:spcPct val="100000"/>
-              </a:lnSpc>
-              <a:buFont typeface="Liberation Serif"/>
-              <a:buAutoNum type="arabicPeriod"/>
-            </a:pPr>
-            <a:r>
-              <a:rPr lang="en-GB" sz="3200" strike="noStrike">
-                <a:solidFill>
-                  <a:srgbClr val="f2f2f2"/>
-                </a:solidFill>
-                <a:latin typeface="Calibri"/>
-                <a:ea typeface="DejaVu Sans"/>
-              </a:rPr>
-              <a:t> </a:t>
-            </a:r>
-            <a:r>
-              <a:rPr lang="en-GB" sz="3200" strike="noStrike">
-                <a:solidFill>
-                  <a:srgbClr val="f2f2f2"/>
-                </a:solidFill>
-                <a:latin typeface="Calibri"/>
-                <a:ea typeface="DejaVu Sans"/>
-              </a:rPr>
               <a:t>Мобилно устройство по ваш избор.</a:t>
             </a:r>
             <a:endParaRPr/>
@@ -6831,9 +5346,6 @@
               <a:lnSpc>
                 <a:spcPct val="100000"/>
               </a:lnSpc>
-              <a:buSzPct val="45000"/>
-              <a:buFont typeface="StarSymbol"/>
-              <a:buChar char=""/>
             </a:pPr>
             <a:endParaRPr/>
           </a:p>
@@ -6842,9 +5354,6 @@
               <a:lnSpc>
                 <a:spcPct val="100000"/>
               </a:lnSpc>
-              <a:buSzPct val="45000"/>
-              <a:buFont typeface="StarSymbol"/>
-              <a:buChar char=""/>
             </a:pPr>
             <a:endParaRPr/>
           </a:p>
@@ -6901,14 +5410,14 @@
       </p:grpSpPr>
       <p:sp>
         <p:nvSpPr>
-          <p:cNvPr id="179" name="CustomShape 1"/>
+          <p:cNvPr id="140" name="CustomShape 1"/>
           <p:cNvSpPr/>
           <p:nvPr/>
         </p:nvSpPr>
         <p:spPr>
           <a:xfrm>
             <a:off x="838080" y="685800"/>
-            <a:ext cx="8228520" cy="1141920"/>
+            <a:ext cx="8228160" cy="1141560"/>
           </a:xfrm>
           <a:prstGeom prst="rect">
             <a:avLst/>
@@ -6948,14 +5457,14 @@
       </p:sp>
       <p:sp>
         <p:nvSpPr>
-          <p:cNvPr id="180" name="CustomShape 2"/>
+          <p:cNvPr id="141" name="CustomShape 2"/>
           <p:cNvSpPr/>
           <p:nvPr/>
         </p:nvSpPr>
         <p:spPr>
           <a:xfrm>
             <a:off x="762120" y="1676520"/>
-            <a:ext cx="7847640" cy="4524840"/>
+            <a:ext cx="7847280" cy="4524480"/>
           </a:xfrm>
           <a:prstGeom prst="rect">
             <a:avLst/>
@@ -7076,14 +5585,14 @@
       </p:grpSpPr>
       <p:sp>
         <p:nvSpPr>
-          <p:cNvPr id="149" name="CustomShape 1"/>
+          <p:cNvPr id="110" name="CustomShape 1"/>
           <p:cNvSpPr/>
           <p:nvPr/>
         </p:nvSpPr>
         <p:spPr>
           <a:xfrm>
             <a:off x="838080" y="685800"/>
-            <a:ext cx="8228520" cy="1141920"/>
+            <a:ext cx="8228160" cy="1141560"/>
           </a:xfrm>
           <a:prstGeom prst="rect">
             <a:avLst/>
@@ -7123,14 +5632,14 @@
       </p:sp>
       <p:sp>
         <p:nvSpPr>
-          <p:cNvPr id="150" name="CustomShape 2"/>
+          <p:cNvPr id="111" name="CustomShape 2"/>
           <p:cNvSpPr/>
           <p:nvPr/>
         </p:nvSpPr>
         <p:spPr>
           <a:xfrm>
             <a:off x="762120" y="1676520"/>
-            <a:ext cx="7847640" cy="4524840"/>
+            <a:ext cx="7847280" cy="4524480"/>
           </a:xfrm>
           <a:prstGeom prst="rect">
             <a:avLst/>
@@ -7219,14 +5728,14 @@
       </p:grpSpPr>
       <p:sp>
         <p:nvSpPr>
-          <p:cNvPr id="151" name="CustomShape 1"/>
+          <p:cNvPr id="112" name="CustomShape 1"/>
           <p:cNvSpPr/>
           <p:nvPr/>
         </p:nvSpPr>
         <p:spPr>
           <a:xfrm>
             <a:off x="838080" y="685800"/>
-            <a:ext cx="8228520" cy="1141920"/>
+            <a:ext cx="8228160" cy="1141560"/>
           </a:xfrm>
           <a:prstGeom prst="rect">
             <a:avLst/>
@@ -7266,14 +5775,14 @@
       </p:sp>
       <p:sp>
         <p:nvSpPr>
-          <p:cNvPr id="152" name="CustomShape 2"/>
+          <p:cNvPr id="113" name="CustomShape 2"/>
           <p:cNvSpPr/>
           <p:nvPr/>
         </p:nvSpPr>
         <p:spPr>
           <a:xfrm>
             <a:off x="762120" y="1676520"/>
-            <a:ext cx="7847640" cy="4524840"/>
+            <a:ext cx="7847280" cy="4524480"/>
           </a:xfrm>
           <a:prstGeom prst="rect">
             <a:avLst/>
@@ -7313,7 +5822,7 @@
       </p:sp>
       <p:pic>
         <p:nvPicPr>
-          <p:cNvPr id="153" name="" descr=""/>
+          <p:cNvPr id="114" name="" descr=""/>
           <p:cNvPicPr/>
           <p:nvPr/>
         </p:nvPicPr>
@@ -7324,7 +5833,7 @@
         <p:spPr>
           <a:xfrm>
             <a:off x="5040000" y="3600000"/>
-            <a:ext cx="3167640" cy="2761560"/>
+            <a:ext cx="3167280" cy="2761200"/>
           </a:xfrm>
           <a:prstGeom prst="rect">
             <a:avLst/>
@@ -7385,14 +5894,14 @@
       </p:grpSpPr>
       <p:sp>
         <p:nvSpPr>
-          <p:cNvPr id="154" name="CustomShape 1"/>
+          <p:cNvPr id="115" name="CustomShape 1"/>
           <p:cNvSpPr/>
           <p:nvPr/>
         </p:nvSpPr>
         <p:spPr>
           <a:xfrm>
             <a:off x="838080" y="685800"/>
-            <a:ext cx="8228520" cy="1141920"/>
+            <a:ext cx="8228160" cy="1141560"/>
           </a:xfrm>
           <a:prstGeom prst="rect">
             <a:avLst/>
@@ -7432,14 +5941,14 @@
       </p:sp>
       <p:sp>
         <p:nvSpPr>
-          <p:cNvPr id="155" name="CustomShape 2"/>
+          <p:cNvPr id="116" name="CustomShape 2"/>
           <p:cNvSpPr/>
           <p:nvPr/>
         </p:nvSpPr>
         <p:spPr>
           <a:xfrm>
             <a:off x="762120" y="1676520"/>
-            <a:ext cx="7847640" cy="4524840"/>
+            <a:ext cx="7847280" cy="4524480"/>
           </a:xfrm>
           <a:prstGeom prst="rect">
             <a:avLst/>
@@ -7573,14 +6082,14 @@
       </p:grpSpPr>
       <p:sp>
         <p:nvSpPr>
-          <p:cNvPr id="156" name="CustomShape 1"/>
+          <p:cNvPr id="117" name="CustomShape 1"/>
           <p:cNvSpPr/>
           <p:nvPr/>
         </p:nvSpPr>
         <p:spPr>
           <a:xfrm>
             <a:off x="838080" y="685800"/>
-            <a:ext cx="8228520" cy="1141920"/>
+            <a:ext cx="8228160" cy="1141560"/>
           </a:xfrm>
           <a:prstGeom prst="rect">
             <a:avLst/>
@@ -7620,14 +6129,14 @@
       </p:sp>
       <p:sp>
         <p:nvSpPr>
-          <p:cNvPr id="157" name="CustomShape 2"/>
+          <p:cNvPr id="118" name="CustomShape 2"/>
           <p:cNvSpPr/>
           <p:nvPr/>
         </p:nvSpPr>
         <p:spPr>
           <a:xfrm>
             <a:off x="762120" y="1676520"/>
-            <a:ext cx="7847640" cy="4524840"/>
+            <a:ext cx="7847280" cy="4524480"/>
           </a:xfrm>
           <a:prstGeom prst="rect">
             <a:avLst/>
@@ -7761,14 +6270,14 @@
       </p:grpSpPr>
       <p:sp>
         <p:nvSpPr>
-          <p:cNvPr id="158" name="CustomShape 1"/>
+          <p:cNvPr id="119" name="CustomShape 1"/>
           <p:cNvSpPr/>
           <p:nvPr/>
         </p:nvSpPr>
         <p:spPr>
           <a:xfrm>
             <a:off x="838080" y="685800"/>
-            <a:ext cx="8228520" cy="1141920"/>
+            <a:ext cx="8228160" cy="1141560"/>
           </a:xfrm>
           <a:prstGeom prst="rect">
             <a:avLst/>
@@ -7808,14 +6317,14 @@
       </p:sp>
       <p:sp>
         <p:nvSpPr>
-          <p:cNvPr id="159" name="CustomShape 2"/>
+          <p:cNvPr id="120" name="CustomShape 2"/>
           <p:cNvSpPr/>
           <p:nvPr/>
         </p:nvSpPr>
         <p:spPr>
           <a:xfrm>
             <a:off x="762120" y="1676520"/>
-            <a:ext cx="7847640" cy="4524840"/>
+            <a:ext cx="7847280" cy="4524480"/>
           </a:xfrm>
           <a:prstGeom prst="rect">
             <a:avLst/>
@@ -7904,14 +6413,14 @@
       </p:grpSpPr>
       <p:sp>
         <p:nvSpPr>
-          <p:cNvPr id="160" name="CustomShape 1"/>
+          <p:cNvPr id="121" name="CustomShape 1"/>
           <p:cNvSpPr/>
           <p:nvPr/>
         </p:nvSpPr>
         <p:spPr>
           <a:xfrm>
             <a:off x="838080" y="685800"/>
-            <a:ext cx="8228520" cy="1141920"/>
+            <a:ext cx="8228160" cy="1141560"/>
           </a:xfrm>
           <a:prstGeom prst="rect">
             <a:avLst/>
@@ -7951,14 +6460,14 @@
       </p:sp>
       <p:sp>
         <p:nvSpPr>
-          <p:cNvPr id="161" name="CustomShape 2"/>
+          <p:cNvPr id="122" name="CustomShape 2"/>
           <p:cNvSpPr/>
           <p:nvPr/>
         </p:nvSpPr>
         <p:spPr>
           <a:xfrm>
             <a:off x="762120" y="1676520"/>
-            <a:ext cx="7847640" cy="4524840"/>
+            <a:ext cx="7847280" cy="4524480"/>
           </a:xfrm>
           <a:prstGeom prst="rect">
             <a:avLst/>
@@ -8123,7 +6632,7 @@
               </a:lnSpc>
               <a:buSzPct val="45000"/>
               <a:buFont typeface="StarSymbol"/>
-              <a:buChar char=""/>
+              <a:buChar char="l"/>
             </a:pPr>
             <a:r>
               <a:rPr lang="en-GB" sz="3200" strike="noStrike">
@@ -8200,14 +6709,14 @@
       </p:grpSpPr>
       <p:sp>
         <p:nvSpPr>
-          <p:cNvPr id="162" name="CustomShape 1"/>
+          <p:cNvPr id="123" name="CustomShape 1"/>
           <p:cNvSpPr/>
           <p:nvPr/>
         </p:nvSpPr>
         <p:spPr>
           <a:xfrm>
             <a:off x="838080" y="685800"/>
-            <a:ext cx="8228520" cy="1141920"/>
+            <a:ext cx="8228160" cy="1141560"/>
           </a:xfrm>
           <a:prstGeom prst="rect">
             <a:avLst/>
@@ -8247,14 +6756,14 @@
       </p:sp>
       <p:sp>
         <p:nvSpPr>
-          <p:cNvPr id="163" name="CustomShape 2"/>
+          <p:cNvPr id="124" name="CustomShape 2"/>
           <p:cNvSpPr/>
           <p:nvPr/>
         </p:nvSpPr>
         <p:spPr>
           <a:xfrm>
             <a:off x="762120" y="1676520"/>
-            <a:ext cx="7847640" cy="4524840"/>
+            <a:ext cx="7847280" cy="4524480"/>
           </a:xfrm>
           <a:prstGeom prst="rect">
             <a:avLst/>
@@ -8279,7 +6788,7 @@
               </a:lnSpc>
               <a:buSzPct val="45000"/>
               <a:buFont typeface="StarSymbol"/>
-              <a:buChar char=""/>
+              <a:buChar char="l"/>
             </a:pPr>
             <a:r>
               <a:rPr lang="en-GB" sz="3200" strike="noStrike">
@@ -8298,9 +6807,6 @@
               <a:lnSpc>
                 <a:spcPct val="100000"/>
               </a:lnSpc>
-              <a:buSzPct val="45000"/>
-              <a:buFont typeface="StarSymbol"/>
-              <a:buChar char=""/>
             </a:pPr>
             <a:endParaRPr/>
           </a:p>
@@ -8308,7 +6814,7 @@
       </p:sp>
       <p:pic>
         <p:nvPicPr>
-          <p:cNvPr id="164" name="" descr=""/>
+          <p:cNvPr id="125" name="" descr=""/>
           <p:cNvPicPr/>
           <p:nvPr/>
         </p:nvPicPr>
@@ -8319,7 +6825,7 @@
         <p:spPr>
           <a:xfrm>
             <a:off x="1152000" y="2844360"/>
-            <a:ext cx="7200000" cy="2915640"/>
+            <a:ext cx="7199640" cy="2915280"/>
           </a:xfrm>
           <a:prstGeom prst="rect">
             <a:avLst/>
@@ -8380,14 +6886,14 @@
       </p:grpSpPr>
       <p:sp>
         <p:nvSpPr>
-          <p:cNvPr id="165" name="CustomShape 1"/>
+          <p:cNvPr id="126" name="CustomShape 1"/>
           <p:cNvSpPr/>
           <p:nvPr/>
         </p:nvSpPr>
         <p:spPr>
           <a:xfrm>
             <a:off x="838080" y="685800"/>
-            <a:ext cx="8228520" cy="1141920"/>
+            <a:ext cx="8228160" cy="1141560"/>
           </a:xfrm>
           <a:prstGeom prst="rect">
             <a:avLst/>
@@ -8427,14 +6933,14 @@
       </p:sp>
       <p:sp>
         <p:nvSpPr>
-          <p:cNvPr id="166" name="CustomShape 2"/>
+          <p:cNvPr id="127" name="CustomShape 2"/>
           <p:cNvSpPr/>
           <p:nvPr/>
         </p:nvSpPr>
         <p:spPr>
           <a:xfrm>
             <a:off x="762120" y="1676520"/>
-            <a:ext cx="7847640" cy="4524840"/>
+            <a:ext cx="7847280" cy="4524480"/>
           </a:xfrm>
           <a:prstGeom prst="rect">
             <a:avLst/>
@@ -8459,7 +6965,7 @@
               </a:lnSpc>
               <a:buSzPct val="45000"/>
               <a:buFont typeface="StarSymbol"/>
-              <a:buChar char=""/>
+              <a:buChar char="l"/>
             </a:pPr>
             <a:r>
               <a:rPr lang="en-GB" sz="3200" strike="noStrike">
@@ -8480,7 +6986,7 @@
               </a:lnSpc>
               <a:buSzPct val="45000"/>
               <a:buFont typeface="StarSymbol"/>
-              <a:buChar char=""/>
+              <a:buChar char="l"/>
             </a:pPr>
             <a:r>
               <a:rPr lang="en-GB" sz="3200" strike="noStrike">
@@ -8501,7 +7007,7 @@
               </a:lnSpc>
               <a:buSzPct val="45000"/>
               <a:buFont typeface="StarSymbol"/>
-              <a:buChar char=""/>
+              <a:buChar char="l"/>
             </a:pPr>
             <a:r>
               <a:rPr lang="en-GB" sz="3200" strike="noStrike">
@@ -8520,9 +7026,6 @@
               <a:lnSpc>
                 <a:spcPct val="100000"/>
               </a:lnSpc>
-              <a:buSzPct val="45000"/>
-              <a:buFont typeface="StarSymbol"/>
-              <a:buChar char=""/>
             </a:pPr>
             <a:endParaRPr/>
           </a:p>
@@ -8531,9 +7034,6 @@
               <a:lnSpc>
                 <a:spcPct val="100000"/>
               </a:lnSpc>
-              <a:buSzPct val="45000"/>
-              <a:buFont typeface="StarSymbol"/>
-              <a:buChar char=""/>
             </a:pPr>
             <a:endParaRPr/>
           </a:p>
@@ -9238,227 +7738,4 @@
     </a:fmtScheme>
   </a:themeElements>
 </a:theme>
-</file>
-
-<file path=ppt/theme/theme4.xml><?xml version="1.0" encoding="utf-8"?>
-<a:theme xmlns:a="http://schemas.openxmlformats.org/drawingml/2006/main" name="Office Theme">
-  <a:themeElements>
-    <a:clrScheme name="Office">
-      <a:dk1>
-        <a:sysClr val="windowText" lastClr="000000"/>
-      </a:dk1>
-      <a:lt1>
-        <a:sysClr val="window" lastClr="FFFFFF"/>
-      </a:lt1>
-      <a:dk2>
-        <a:srgbClr val="1F497D"/>
-      </a:dk2>
-      <a:lt2>
-        <a:srgbClr val="EEECE1"/>
-      </a:lt2>
-      <a:accent1>
-        <a:srgbClr val="4F81BD"/>
-      </a:accent1>
-      <a:accent2>
-        <a:srgbClr val="C0504D"/>
-      </a:accent2>
-      <a:accent3>
-        <a:srgbClr val="9BBB59"/>
-      </a:accent3>
-      <a:accent4>
-        <a:srgbClr val="8064A2"/>
-      </a:accent4>
-      <a:accent5>
-        <a:srgbClr val="4BACC6"/>
-      </a:accent5>
-      <a:accent6>
-        <a:srgbClr val="F79646"/>
-      </a:accent6>
-      <a:hlink>
-        <a:srgbClr val="0000FF"/>
-      </a:hlink>
-      <a:folHlink>
-        <a:srgbClr val="800080"/>
-      </a:folHlink>
-    </a:clrScheme>
-    <a:fontScheme name="Office">
-      <a:majorFont>
-        <a:latin typeface="Arial"/>
-        <a:ea typeface="DejaVu Sans"/>
-        <a:cs typeface="DejaVu Sans"/>
-      </a:majorFont>
-      <a:minorFont>
-        <a:latin typeface="Arial"/>
-        <a:ea typeface="DejaVu Sans"/>
-        <a:cs typeface="DejaVu Sans"/>
-      </a:minorFont>
-    </a:fontScheme>
-    <a:fmtScheme name="Office">
-      <a:fillStyleLst>
-        <a:solidFill>
-          <a:schemeClr val="phClr"/>
-        </a:solidFill>
-        <a:gradFill rotWithShape="1">
-          <a:gsLst>
-            <a:gs pos="0">
-              <a:schemeClr val="phClr">
-                <a:tint val="50000"/>
-                <a:satMod val="300000"/>
-              </a:schemeClr>
-            </a:gs>
-            <a:gs pos="35000">
-              <a:schemeClr val="phClr">
-                <a:tint val="37000"/>
-                <a:satMod val="300000"/>
-              </a:schemeClr>
-            </a:gs>
-            <a:gs pos="100000">
-              <a:schemeClr val="phClr">
-                <a:tint val="15000"/>
-                <a:satMod val="350000"/>
-              </a:schemeClr>
-            </a:gs>
-          </a:gsLst>
-          <a:lin ang="16200000" scaled="1"/>
-        </a:gradFill>
-        <a:gradFill rotWithShape="1">
-          <a:gsLst>
-            <a:gs pos="0">
-              <a:schemeClr val="phClr">
-                <a:shade val="51000"/>
-                <a:satMod val="130000"/>
-              </a:schemeClr>
-            </a:gs>
-            <a:gs pos="80000">
-              <a:schemeClr val="phClr">
-                <a:shade val="93000"/>
-                <a:satMod val="130000"/>
-              </a:schemeClr>
-            </a:gs>
-            <a:gs pos="100000">
-              <a:schemeClr val="phClr">
-                <a:shade val="94000"/>
-                <a:satMod val="135000"/>
-              </a:schemeClr>
-            </a:gs>
-          </a:gsLst>
-          <a:lin ang="16200000" scaled="0"/>
-        </a:gradFill>
-      </a:fillStyleLst>
-      <a:lnStyleLst>
-        <a:ln w="9525" cap="flat" cmpd="sng" algn="ctr">
-          <a:solidFill>
-            <a:schemeClr val="phClr">
-              <a:shade val="95000"/>
-              <a:satMod val="105000"/>
-            </a:schemeClr>
-          </a:solidFill>
-          <a:prstDash val="solid"/>
-        </a:ln>
-        <a:ln w="25400" cap="flat" cmpd="sng" algn="ctr">
-          <a:solidFill>
-            <a:schemeClr val="phClr"/>
-          </a:solidFill>
-          <a:prstDash val="solid"/>
-        </a:ln>
-        <a:ln w="38100" cap="flat" cmpd="sng" algn="ctr">
-          <a:solidFill>
-            <a:schemeClr val="phClr"/>
-          </a:solidFill>
-          <a:prstDash val="solid"/>
-        </a:ln>
-      </a:lnStyleLst>
-      <a:effectStyleLst>
-        <a:effectStyle>
-          <a:effectLst>
-            <a:outerShdw blurRad="40000" dist="20000" dir="5400000" rotWithShape="0">
-              <a:srgbClr val="000000">
-                <a:alpha val="38000"/>
-              </a:srgbClr>
-            </a:outerShdw>
-          </a:effectLst>
-        </a:effectStyle>
-        <a:effectStyle>
-          <a:effectLst>
-            <a:outerShdw blurRad="40000" dist="23000" dir="5400000" rotWithShape="0">
-              <a:srgbClr val="000000">
-                <a:alpha val="35000"/>
-              </a:srgbClr>
-            </a:outerShdw>
-          </a:effectLst>
-        </a:effectStyle>
-        <a:effectStyle>
-          <a:effectLst>
-            <a:outerShdw blurRad="40000" dist="23000" dir="5400000" rotWithShape="0">
-              <a:srgbClr val="000000">
-                <a:alpha val="35000"/>
-              </a:srgbClr>
-            </a:outerShdw>
-          </a:effectLst>
-          <a:scene3d>
-            <a:camera prst="orthographicFront">
-              <a:rot lat="0" lon="0" rev="0"/>
-            </a:camera>
-            <a:lightRig rig="threePt" dir="t">
-              <a:rot lat="0" lon="0" rev="1200000"/>
-            </a:lightRig>
-          </a:scene3d>
-          <a:sp3d>
-            <a:bevelT w="63500" h="25400"/>
-          </a:sp3d>
-        </a:effectStyle>
-      </a:effectStyleLst>
-      <a:bgFillStyleLst>
-        <a:solidFill>
-          <a:schemeClr val="phClr"/>
-        </a:solidFill>
-        <a:gradFill rotWithShape="1">
-          <a:gsLst>
-            <a:gs pos="0">
-              <a:schemeClr val="phClr">
-                <a:tint val="40000"/>
-                <a:satMod val="350000"/>
-              </a:schemeClr>
-            </a:gs>
-            <a:gs pos="40000">
-              <a:schemeClr val="phClr">
-                <a:tint val="45000"/>
-                <a:shade val="99000"/>
-                <a:satMod val="350000"/>
-              </a:schemeClr>
-            </a:gs>
-            <a:gs pos="100000">
-              <a:schemeClr val="phClr">
-                <a:shade val="20000"/>
-                <a:satMod val="255000"/>
-              </a:schemeClr>
-            </a:gs>
-          </a:gsLst>
-          <a:path path="circle">
-            <a:fillToRect l="50000" t="-80000" r="50000" b="180000"/>
-          </a:path>
-        </a:gradFill>
-        <a:gradFill rotWithShape="1">
-          <a:gsLst>
-            <a:gs pos="0">
-              <a:schemeClr val="phClr">
-                <a:tint val="80000"/>
-                <a:satMod val="300000"/>
-              </a:schemeClr>
-            </a:gs>
-            <a:gs pos="100000">
-              <a:schemeClr val="phClr">
-                <a:shade val="30000"/>
-                <a:satMod val="200000"/>
-              </a:schemeClr>
-            </a:gs>
-          </a:gsLst>
-          <a:path path="circle">
-            <a:fillToRect l="50000" t="50000" r="50000" b="50000"/>
-          </a:path>
-        </a:gradFill>
-      </a:bgFillStyleLst>
-    </a:fmtScheme>
-  </a:themeElements>
-</a:theme>
 </file>
</xml_diff>